<commit_message>
Deploying to gh-pages from @ HinnyTsang/presentation-mcf-project@23fadaeda33203fbd03ad6bc41089070ba78e969 🚀
</commit_message>
<xml_diff>
--- a/README.pptx
+++ b/README.pptx
@@ -13,15 +13,9 @@
     <p:sldId id="261" r:id="rId7"/>
     <p:sldId id="262" r:id="rId8"/>
     <p:sldId id="263" r:id="rId9"/>
-    <p:sldId id="264" r:id="rId10"/>
-    <p:sldId id="265" r:id="rId11"/>
-    <p:sldId id="266" r:id="rId12"/>
-    <p:sldId id="267" r:id="rId13"/>
-    <p:sldId id="268" r:id="rId14"/>
-    <p:sldId id="269" r:id="rId15"/>
   </p:sldIdLst>
   <p:notesMasterIdLst>
-    <p:notesMasterId r:id="rId16"/>
+    <p:notesMasterId r:id="rId10"/>
   </p:notesMasterIdLst>
   <p:sldSz cx="12192000" cy="6858000"/>
   <p:notesSz cx="6858000" cy="12192000"/>
@@ -557,446 +551,6 @@
 </p:notes>
 </file>
 
-<file path=ppt/notesSlides/notesSlide10.xml><?xml version="1.0" encoding="utf-8"?>
-<p:notes xmlns:a="http://schemas.openxmlformats.org/drawingml/2006/main" xmlns:r="http://schemas.openxmlformats.org/officeDocument/2006/relationships" xmlns:p="http://schemas.openxmlformats.org/presentationml/2006/main">
-  <p:cSld>
-    <p:spTree>
-      <p:nvGrpSpPr>
-        <p:cNvPr id="1" name=""/>
-        <p:cNvGrpSpPr/>
-        <p:nvPr/>
-      </p:nvGrpSpPr>
-      <p:grpSpPr>
-        <a:xfrm>
-          <a:off x="0" y="0"/>
-          <a:ext cx="0" cy="0"/>
-          <a:chOff x="0" y="0"/>
-          <a:chExt cx="0" cy="0"/>
-        </a:xfrm>
-      </p:grpSpPr>
-      <p:sp>
-        <p:nvSpPr>
-          <p:cNvPr id="2" name="Slide Image Placeholder 1"/>
-          <p:cNvSpPr>
-            <a:spLocks noGrp="1" noRot="1" noChangeAspect="1"/>
-          </p:cNvSpPr>
-          <p:nvPr>
-            <p:ph type="sldImg"/>
-          </p:nvPr>
-        </p:nvSpPr>
-        <p:spPr/>
-      </p:sp>
-      <p:sp>
-        <p:nvSpPr>
-          <p:cNvPr id="3" name="Notes Placeholder 2"/>
-          <p:cNvSpPr>
-            <a:spLocks noGrp="1"/>
-          </p:cNvSpPr>
-          <p:nvPr>
-            <p:ph type="body" idx="1"/>
-          </p:nvPr>
-        </p:nvSpPr>
-        <p:spPr/>
-        <p:txBody>
-          <a:bodyPr/>
-          <a:lstStyle/>
-          <a:p>
-            <a:r>
-              <a:rPr lang="en-US" dirty="0"/>
-              <a:t/>
-            </a:r>
-            <a:endParaRPr lang="en-US" dirty="0"/>
-          </a:p>
-        </p:txBody>
-      </p:sp>
-      <p:sp>
-        <p:nvSpPr>
-          <p:cNvPr id="4" name="Slide Number Placeholder 3"/>
-          <p:cNvSpPr>
-            <a:spLocks noGrp="1"/>
-          </p:cNvSpPr>
-          <p:nvPr>
-            <p:ph type="sldNum" sz="quarter" idx="10"/>
-          </p:nvPr>
-        </p:nvSpPr>
-        <p:spPr/>
-        <p:txBody>
-          <a:bodyPr/>
-          <a:lstStyle/>
-          <a:p>
-            <a:fld id="{F7021451-1387-4CA6-816F-3879F97B5CBC}" type="slidenum">
-              <a:rPr lang="en-US"/>
-              <a:t>10</a:t>
-            </a:fld>
-            <a:endParaRPr lang="en-US"/>
-          </a:p>
-        </p:txBody>
-      </p:sp>
-    </p:spTree>
-    <p:extLst>
-      <p:ext uri="{BB962C8B-B14F-4D97-AF65-F5344CB8AC3E}">
-        <p14:creationId xmlns:p14="http://schemas.microsoft.com/office/powerpoint/2010/main" val="1024086991"/>
-      </p:ext>
-    </p:extLst>
-  </p:cSld>
-  <p:clrMapOvr>
-    <a:masterClrMapping/>
-  </p:clrMapOvr>
-</p:notes>
-</file>
-
-<file path=ppt/notesSlides/notesSlide11.xml><?xml version="1.0" encoding="utf-8"?>
-<p:notes xmlns:a="http://schemas.openxmlformats.org/drawingml/2006/main" xmlns:r="http://schemas.openxmlformats.org/officeDocument/2006/relationships" xmlns:p="http://schemas.openxmlformats.org/presentationml/2006/main">
-  <p:cSld>
-    <p:spTree>
-      <p:nvGrpSpPr>
-        <p:cNvPr id="1" name=""/>
-        <p:cNvGrpSpPr/>
-        <p:nvPr/>
-      </p:nvGrpSpPr>
-      <p:grpSpPr>
-        <a:xfrm>
-          <a:off x="0" y="0"/>
-          <a:ext cx="0" cy="0"/>
-          <a:chOff x="0" y="0"/>
-          <a:chExt cx="0" cy="0"/>
-        </a:xfrm>
-      </p:grpSpPr>
-      <p:sp>
-        <p:nvSpPr>
-          <p:cNvPr id="2" name="Slide Image Placeholder 1"/>
-          <p:cNvSpPr>
-            <a:spLocks noGrp="1" noRot="1" noChangeAspect="1"/>
-          </p:cNvSpPr>
-          <p:nvPr>
-            <p:ph type="sldImg"/>
-          </p:nvPr>
-        </p:nvSpPr>
-        <p:spPr/>
-      </p:sp>
-      <p:sp>
-        <p:nvSpPr>
-          <p:cNvPr id="3" name="Notes Placeholder 2"/>
-          <p:cNvSpPr>
-            <a:spLocks noGrp="1"/>
-          </p:cNvSpPr>
-          <p:nvPr>
-            <p:ph type="body" idx="1"/>
-          </p:nvPr>
-        </p:nvSpPr>
-        <p:spPr/>
-        <p:txBody>
-          <a:bodyPr/>
-          <a:lstStyle/>
-          <a:p>
-            <a:r>
-              <a:rPr lang="en-US" dirty="0"/>
-              <a:t/>
-            </a:r>
-            <a:endParaRPr lang="en-US" dirty="0"/>
-          </a:p>
-        </p:txBody>
-      </p:sp>
-      <p:sp>
-        <p:nvSpPr>
-          <p:cNvPr id="4" name="Slide Number Placeholder 3"/>
-          <p:cNvSpPr>
-            <a:spLocks noGrp="1"/>
-          </p:cNvSpPr>
-          <p:nvPr>
-            <p:ph type="sldNum" sz="quarter" idx="10"/>
-          </p:nvPr>
-        </p:nvSpPr>
-        <p:spPr/>
-        <p:txBody>
-          <a:bodyPr/>
-          <a:lstStyle/>
-          <a:p>
-            <a:fld id="{F7021451-1387-4CA6-816F-3879F97B5CBC}" type="slidenum">
-              <a:rPr lang="en-US"/>
-              <a:t>11</a:t>
-            </a:fld>
-            <a:endParaRPr lang="en-US"/>
-          </a:p>
-        </p:txBody>
-      </p:sp>
-    </p:spTree>
-    <p:extLst>
-      <p:ext uri="{BB962C8B-B14F-4D97-AF65-F5344CB8AC3E}">
-        <p14:creationId xmlns:p14="http://schemas.microsoft.com/office/powerpoint/2010/main" val="1024086991"/>
-      </p:ext>
-    </p:extLst>
-  </p:cSld>
-  <p:clrMapOvr>
-    <a:masterClrMapping/>
-  </p:clrMapOvr>
-</p:notes>
-</file>
-
-<file path=ppt/notesSlides/notesSlide12.xml><?xml version="1.0" encoding="utf-8"?>
-<p:notes xmlns:a="http://schemas.openxmlformats.org/drawingml/2006/main" xmlns:r="http://schemas.openxmlformats.org/officeDocument/2006/relationships" xmlns:p="http://schemas.openxmlformats.org/presentationml/2006/main">
-  <p:cSld>
-    <p:spTree>
-      <p:nvGrpSpPr>
-        <p:cNvPr id="1" name=""/>
-        <p:cNvGrpSpPr/>
-        <p:nvPr/>
-      </p:nvGrpSpPr>
-      <p:grpSpPr>
-        <a:xfrm>
-          <a:off x="0" y="0"/>
-          <a:ext cx="0" cy="0"/>
-          <a:chOff x="0" y="0"/>
-          <a:chExt cx="0" cy="0"/>
-        </a:xfrm>
-      </p:grpSpPr>
-      <p:sp>
-        <p:nvSpPr>
-          <p:cNvPr id="2" name="Slide Image Placeholder 1"/>
-          <p:cNvSpPr>
-            <a:spLocks noGrp="1" noRot="1" noChangeAspect="1"/>
-          </p:cNvSpPr>
-          <p:nvPr>
-            <p:ph type="sldImg"/>
-          </p:nvPr>
-        </p:nvSpPr>
-        <p:spPr/>
-      </p:sp>
-      <p:sp>
-        <p:nvSpPr>
-          <p:cNvPr id="3" name="Notes Placeholder 2"/>
-          <p:cNvSpPr>
-            <a:spLocks noGrp="1"/>
-          </p:cNvSpPr>
-          <p:nvPr>
-            <p:ph type="body" idx="1"/>
-          </p:nvPr>
-        </p:nvSpPr>
-        <p:spPr/>
-        <p:txBody>
-          <a:bodyPr/>
-          <a:lstStyle/>
-          <a:p>
-            <a:r>
-              <a:rPr lang="en-US" dirty="0"/>
-              <a:t/>
-            </a:r>
-            <a:endParaRPr lang="en-US" dirty="0"/>
-          </a:p>
-        </p:txBody>
-      </p:sp>
-      <p:sp>
-        <p:nvSpPr>
-          <p:cNvPr id="4" name="Slide Number Placeholder 3"/>
-          <p:cNvSpPr>
-            <a:spLocks noGrp="1"/>
-          </p:cNvSpPr>
-          <p:nvPr>
-            <p:ph type="sldNum" sz="quarter" idx="10"/>
-          </p:nvPr>
-        </p:nvSpPr>
-        <p:spPr/>
-        <p:txBody>
-          <a:bodyPr/>
-          <a:lstStyle/>
-          <a:p>
-            <a:fld id="{F7021451-1387-4CA6-816F-3879F97B5CBC}" type="slidenum">
-              <a:rPr lang="en-US"/>
-              <a:t>12</a:t>
-            </a:fld>
-            <a:endParaRPr lang="en-US"/>
-          </a:p>
-        </p:txBody>
-      </p:sp>
-    </p:spTree>
-    <p:extLst>
-      <p:ext uri="{BB962C8B-B14F-4D97-AF65-F5344CB8AC3E}">
-        <p14:creationId xmlns:p14="http://schemas.microsoft.com/office/powerpoint/2010/main" val="1024086991"/>
-      </p:ext>
-    </p:extLst>
-  </p:cSld>
-  <p:clrMapOvr>
-    <a:masterClrMapping/>
-  </p:clrMapOvr>
-</p:notes>
-</file>
-
-<file path=ppt/notesSlides/notesSlide13.xml><?xml version="1.0" encoding="utf-8"?>
-<p:notes xmlns:a="http://schemas.openxmlformats.org/drawingml/2006/main" xmlns:r="http://schemas.openxmlformats.org/officeDocument/2006/relationships" xmlns:p="http://schemas.openxmlformats.org/presentationml/2006/main">
-  <p:cSld>
-    <p:spTree>
-      <p:nvGrpSpPr>
-        <p:cNvPr id="1" name=""/>
-        <p:cNvGrpSpPr/>
-        <p:nvPr/>
-      </p:nvGrpSpPr>
-      <p:grpSpPr>
-        <a:xfrm>
-          <a:off x="0" y="0"/>
-          <a:ext cx="0" cy="0"/>
-          <a:chOff x="0" y="0"/>
-          <a:chExt cx="0" cy="0"/>
-        </a:xfrm>
-      </p:grpSpPr>
-      <p:sp>
-        <p:nvSpPr>
-          <p:cNvPr id="2" name="Slide Image Placeholder 1"/>
-          <p:cNvSpPr>
-            <a:spLocks noGrp="1" noRot="1" noChangeAspect="1"/>
-          </p:cNvSpPr>
-          <p:nvPr>
-            <p:ph type="sldImg"/>
-          </p:nvPr>
-        </p:nvSpPr>
-        <p:spPr/>
-      </p:sp>
-      <p:sp>
-        <p:nvSpPr>
-          <p:cNvPr id="3" name="Notes Placeholder 2"/>
-          <p:cNvSpPr>
-            <a:spLocks noGrp="1"/>
-          </p:cNvSpPr>
-          <p:nvPr>
-            <p:ph type="body" idx="1"/>
-          </p:nvPr>
-        </p:nvSpPr>
-        <p:spPr/>
-        <p:txBody>
-          <a:bodyPr/>
-          <a:lstStyle/>
-          <a:p>
-            <a:r>
-              <a:rPr lang="en-US" dirty="0"/>
-              <a:t/>
-            </a:r>
-            <a:endParaRPr lang="en-US" dirty="0"/>
-          </a:p>
-        </p:txBody>
-      </p:sp>
-      <p:sp>
-        <p:nvSpPr>
-          <p:cNvPr id="4" name="Slide Number Placeholder 3"/>
-          <p:cNvSpPr>
-            <a:spLocks noGrp="1"/>
-          </p:cNvSpPr>
-          <p:nvPr>
-            <p:ph type="sldNum" sz="quarter" idx="10"/>
-          </p:nvPr>
-        </p:nvSpPr>
-        <p:spPr/>
-        <p:txBody>
-          <a:bodyPr/>
-          <a:lstStyle/>
-          <a:p>
-            <a:fld id="{F7021451-1387-4CA6-816F-3879F97B5CBC}" type="slidenum">
-              <a:rPr lang="en-US"/>
-              <a:t>13</a:t>
-            </a:fld>
-            <a:endParaRPr lang="en-US"/>
-          </a:p>
-        </p:txBody>
-      </p:sp>
-    </p:spTree>
-    <p:extLst>
-      <p:ext uri="{BB962C8B-B14F-4D97-AF65-F5344CB8AC3E}">
-        <p14:creationId xmlns:p14="http://schemas.microsoft.com/office/powerpoint/2010/main" val="1024086991"/>
-      </p:ext>
-    </p:extLst>
-  </p:cSld>
-  <p:clrMapOvr>
-    <a:masterClrMapping/>
-  </p:clrMapOvr>
-</p:notes>
-</file>
-
-<file path=ppt/notesSlides/notesSlide14.xml><?xml version="1.0" encoding="utf-8"?>
-<p:notes xmlns:a="http://schemas.openxmlformats.org/drawingml/2006/main" xmlns:r="http://schemas.openxmlformats.org/officeDocument/2006/relationships" xmlns:p="http://schemas.openxmlformats.org/presentationml/2006/main">
-  <p:cSld>
-    <p:spTree>
-      <p:nvGrpSpPr>
-        <p:cNvPr id="1" name=""/>
-        <p:cNvGrpSpPr/>
-        <p:nvPr/>
-      </p:nvGrpSpPr>
-      <p:grpSpPr>
-        <a:xfrm>
-          <a:off x="0" y="0"/>
-          <a:ext cx="0" cy="0"/>
-          <a:chOff x="0" y="0"/>
-          <a:chExt cx="0" cy="0"/>
-        </a:xfrm>
-      </p:grpSpPr>
-      <p:sp>
-        <p:nvSpPr>
-          <p:cNvPr id="2" name="Slide Image Placeholder 1"/>
-          <p:cNvSpPr>
-            <a:spLocks noGrp="1" noRot="1" noChangeAspect="1"/>
-          </p:cNvSpPr>
-          <p:nvPr>
-            <p:ph type="sldImg"/>
-          </p:nvPr>
-        </p:nvSpPr>
-        <p:spPr/>
-      </p:sp>
-      <p:sp>
-        <p:nvSpPr>
-          <p:cNvPr id="3" name="Notes Placeholder 2"/>
-          <p:cNvSpPr>
-            <a:spLocks noGrp="1"/>
-          </p:cNvSpPr>
-          <p:nvPr>
-            <p:ph type="body" idx="1"/>
-          </p:nvPr>
-        </p:nvSpPr>
-        <p:spPr/>
-        <p:txBody>
-          <a:bodyPr/>
-          <a:lstStyle/>
-          <a:p>
-            <a:r>
-              <a:rPr lang="en-US" dirty="0"/>
-              <a:t/>
-            </a:r>
-            <a:endParaRPr lang="en-US" dirty="0"/>
-          </a:p>
-        </p:txBody>
-      </p:sp>
-      <p:sp>
-        <p:nvSpPr>
-          <p:cNvPr id="4" name="Slide Number Placeholder 3"/>
-          <p:cNvSpPr>
-            <a:spLocks noGrp="1"/>
-          </p:cNvSpPr>
-          <p:nvPr>
-            <p:ph type="sldNum" sz="quarter" idx="10"/>
-          </p:nvPr>
-        </p:nvSpPr>
-        <p:spPr/>
-        <p:txBody>
-          <a:bodyPr/>
-          <a:lstStyle/>
-          <a:p>
-            <a:fld id="{F7021451-1387-4CA6-816F-3879F97B5CBC}" type="slidenum">
-              <a:rPr lang="en-US"/>
-              <a:t>14</a:t>
-            </a:fld>
-            <a:endParaRPr lang="en-US"/>
-          </a:p>
-        </p:txBody>
-      </p:sp>
-    </p:spTree>
-    <p:extLst>
-      <p:ext uri="{BB962C8B-B14F-4D97-AF65-F5344CB8AC3E}">
-        <p14:creationId xmlns:p14="http://schemas.microsoft.com/office/powerpoint/2010/main" val="1024086991"/>
-      </p:ext>
-    </p:extLst>
-  </p:cSld>
-  <p:clrMapOvr>
-    <a:masterClrMapping/>
-  </p:clrMapOvr>
-</p:notes>
-</file>
-
 <file path=ppt/notesSlides/notesSlide2.xml><?xml version="1.0" encoding="utf-8"?>
 <p:notes xmlns:a="http://schemas.openxmlformats.org/drawingml/2006/main" xmlns:r="http://schemas.openxmlformats.org/officeDocument/2006/relationships" xmlns:p="http://schemas.openxmlformats.org/presentationml/2006/main">
   <p:cSld>
@@ -1131,7 +685,7 @@
           <a:p>
             <a:r>
               <a:rPr lang="en-US" dirty="0"/>
-              <a:t/>
+              <a:t>Too Basic</a:t>
             </a:r>
             <a:endParaRPr lang="en-US" dirty="0"/>
           </a:p>
@@ -1307,7 +861,7 @@
           <a:p>
             <a:r>
               <a:rPr lang="en-US" dirty="0"/>
-              <a:t/>
+              <a:t>Logic flow</a:t>
             </a:r>
             <a:endParaRPr lang="en-US" dirty="0"/>
           </a:p>
@@ -1595,94 +1149,6 @@
             <a:fld id="{F7021451-1387-4CA6-816F-3879F97B5CBC}" type="slidenum">
               <a:rPr lang="en-US"/>
               <a:t>8</a:t>
-            </a:fld>
-            <a:endParaRPr lang="en-US"/>
-          </a:p>
-        </p:txBody>
-      </p:sp>
-    </p:spTree>
-    <p:extLst>
-      <p:ext uri="{BB962C8B-B14F-4D97-AF65-F5344CB8AC3E}">
-        <p14:creationId xmlns:p14="http://schemas.microsoft.com/office/powerpoint/2010/main" val="1024086991"/>
-      </p:ext>
-    </p:extLst>
-  </p:cSld>
-  <p:clrMapOvr>
-    <a:masterClrMapping/>
-  </p:clrMapOvr>
-</p:notes>
-</file>
-
-<file path=ppt/notesSlides/notesSlide9.xml><?xml version="1.0" encoding="utf-8"?>
-<p:notes xmlns:a="http://schemas.openxmlformats.org/drawingml/2006/main" xmlns:r="http://schemas.openxmlformats.org/officeDocument/2006/relationships" xmlns:p="http://schemas.openxmlformats.org/presentationml/2006/main">
-  <p:cSld>
-    <p:spTree>
-      <p:nvGrpSpPr>
-        <p:cNvPr id="1" name=""/>
-        <p:cNvGrpSpPr/>
-        <p:nvPr/>
-      </p:nvGrpSpPr>
-      <p:grpSpPr>
-        <a:xfrm>
-          <a:off x="0" y="0"/>
-          <a:ext cx="0" cy="0"/>
-          <a:chOff x="0" y="0"/>
-          <a:chExt cx="0" cy="0"/>
-        </a:xfrm>
-      </p:grpSpPr>
-      <p:sp>
-        <p:nvSpPr>
-          <p:cNvPr id="2" name="Slide Image Placeholder 1"/>
-          <p:cNvSpPr>
-            <a:spLocks noGrp="1" noRot="1" noChangeAspect="1"/>
-          </p:cNvSpPr>
-          <p:nvPr>
-            <p:ph type="sldImg"/>
-          </p:nvPr>
-        </p:nvSpPr>
-        <p:spPr/>
-      </p:sp>
-      <p:sp>
-        <p:nvSpPr>
-          <p:cNvPr id="3" name="Notes Placeholder 2"/>
-          <p:cNvSpPr>
-            <a:spLocks noGrp="1"/>
-          </p:cNvSpPr>
-          <p:nvPr>
-            <p:ph type="body" idx="1"/>
-          </p:nvPr>
-        </p:nvSpPr>
-        <p:spPr/>
-        <p:txBody>
-          <a:bodyPr/>
-          <a:lstStyle/>
-          <a:p>
-            <a:r>
-              <a:rPr lang="en-US" dirty="0"/>
-              <a:t/>
-            </a:r>
-            <a:endParaRPr lang="en-US" dirty="0"/>
-          </a:p>
-        </p:txBody>
-      </p:sp>
-      <p:sp>
-        <p:nvSpPr>
-          <p:cNvPr id="4" name="Slide Number Placeholder 3"/>
-          <p:cNvSpPr>
-            <a:spLocks noGrp="1"/>
-          </p:cNvSpPr>
-          <p:nvPr>
-            <p:ph type="sldNum" sz="quarter" idx="10"/>
-          </p:nvPr>
-        </p:nvSpPr>
-        <p:spPr/>
-        <p:txBody>
-          <a:bodyPr/>
-          <a:lstStyle/>
-          <a:p>
-            <a:fld id="{F7021451-1387-4CA6-816F-3879F97B5CBC}" type="slidenum">
-              <a:rPr lang="en-US"/>
-              <a:t>9</a:t>
             </a:fld>
             <a:endParaRPr lang="en-US"/>
           </a:p>
@@ -2011,201 +1477,6 @@
 <file path=ppt/slides/slide1.xml><?xml version="1.0" encoding="utf-8"?>
 <p:sld xmlns:a="http://schemas.openxmlformats.org/drawingml/2006/main" xmlns:r="http://schemas.openxmlformats.org/officeDocument/2006/relationships" xmlns:p="http://schemas.openxmlformats.org/presentationml/2006/main">
   <p:cSld name="Slide 1">
-    <p:bg>
-      <p:bgPr>
-        <a:blipFill dpi="0" rotWithShape="1">
-          <a:blip r:embed="rId1">
-            <a:lum/>
-          </a:blip>
-          <a:srcRect/>
-          <a:stretch>
-            <a:fillRect/>
-          </a:stretch>
-        </a:blipFill>
-        <a:effectLst/>
-      </p:bgPr>
-    </p:bg>
-    <p:spTree>
-      <p:nvGrpSpPr>
-        <p:cNvPr id="1" name=""/>
-        <p:cNvGrpSpPr/>
-        <p:nvPr/>
-      </p:nvGrpSpPr>
-      <p:grpSpPr>
-        <a:xfrm>
-          <a:off x="0" y="0"/>
-          <a:ext cx="0" cy="0"/>
-          <a:chOff x="0" y="0"/>
-          <a:chExt cx="0" cy="0"/>
-        </a:xfrm>
-      </p:grpSpPr>
-    </p:spTree>
-  </p:cSld>
-  <p:clrMapOvr>
-    <a:masterClrMapping/>
-  </p:clrMapOvr>
-</p:sld>
-</file>
-
-<file path=ppt/slides/slide10.xml><?xml version="1.0" encoding="utf-8"?>
-<p:sld xmlns:a="http://schemas.openxmlformats.org/drawingml/2006/main" xmlns:r="http://schemas.openxmlformats.org/officeDocument/2006/relationships" xmlns:p="http://schemas.openxmlformats.org/presentationml/2006/main">
-  <p:cSld name="Slide 10">
-    <p:bg>
-      <p:bgPr>
-        <a:blipFill dpi="0" rotWithShape="1">
-          <a:blip r:embed="rId1">
-            <a:lum/>
-          </a:blip>
-          <a:srcRect/>
-          <a:stretch>
-            <a:fillRect/>
-          </a:stretch>
-        </a:blipFill>
-        <a:effectLst/>
-      </p:bgPr>
-    </p:bg>
-    <p:spTree>
-      <p:nvGrpSpPr>
-        <p:cNvPr id="1" name=""/>
-        <p:cNvGrpSpPr/>
-        <p:nvPr/>
-      </p:nvGrpSpPr>
-      <p:grpSpPr>
-        <a:xfrm>
-          <a:off x="0" y="0"/>
-          <a:ext cx="0" cy="0"/>
-          <a:chOff x="0" y="0"/>
-          <a:chExt cx="0" cy="0"/>
-        </a:xfrm>
-      </p:grpSpPr>
-    </p:spTree>
-  </p:cSld>
-  <p:clrMapOvr>
-    <a:masterClrMapping/>
-  </p:clrMapOvr>
-</p:sld>
-</file>
-
-<file path=ppt/slides/slide11.xml><?xml version="1.0" encoding="utf-8"?>
-<p:sld xmlns:a="http://schemas.openxmlformats.org/drawingml/2006/main" xmlns:r="http://schemas.openxmlformats.org/officeDocument/2006/relationships" xmlns:p="http://schemas.openxmlformats.org/presentationml/2006/main">
-  <p:cSld name="Slide 11">
-    <p:bg>
-      <p:bgPr>
-        <a:blipFill dpi="0" rotWithShape="1">
-          <a:blip r:embed="rId1">
-            <a:lum/>
-          </a:blip>
-          <a:srcRect/>
-          <a:stretch>
-            <a:fillRect/>
-          </a:stretch>
-        </a:blipFill>
-        <a:effectLst/>
-      </p:bgPr>
-    </p:bg>
-    <p:spTree>
-      <p:nvGrpSpPr>
-        <p:cNvPr id="1" name=""/>
-        <p:cNvGrpSpPr/>
-        <p:nvPr/>
-      </p:nvGrpSpPr>
-      <p:grpSpPr>
-        <a:xfrm>
-          <a:off x="0" y="0"/>
-          <a:ext cx="0" cy="0"/>
-          <a:chOff x="0" y="0"/>
-          <a:chExt cx="0" cy="0"/>
-        </a:xfrm>
-      </p:grpSpPr>
-    </p:spTree>
-  </p:cSld>
-  <p:clrMapOvr>
-    <a:masterClrMapping/>
-  </p:clrMapOvr>
-</p:sld>
-</file>
-
-<file path=ppt/slides/slide12.xml><?xml version="1.0" encoding="utf-8"?>
-<p:sld xmlns:a="http://schemas.openxmlformats.org/drawingml/2006/main" xmlns:r="http://schemas.openxmlformats.org/officeDocument/2006/relationships" xmlns:p="http://schemas.openxmlformats.org/presentationml/2006/main">
-  <p:cSld name="Slide 12">
-    <p:bg>
-      <p:bgPr>
-        <a:blipFill dpi="0" rotWithShape="1">
-          <a:blip r:embed="rId1">
-            <a:lum/>
-          </a:blip>
-          <a:srcRect/>
-          <a:stretch>
-            <a:fillRect/>
-          </a:stretch>
-        </a:blipFill>
-        <a:effectLst/>
-      </p:bgPr>
-    </p:bg>
-    <p:spTree>
-      <p:nvGrpSpPr>
-        <p:cNvPr id="1" name=""/>
-        <p:cNvGrpSpPr/>
-        <p:nvPr/>
-      </p:nvGrpSpPr>
-      <p:grpSpPr>
-        <a:xfrm>
-          <a:off x="0" y="0"/>
-          <a:ext cx="0" cy="0"/>
-          <a:chOff x="0" y="0"/>
-          <a:chExt cx="0" cy="0"/>
-        </a:xfrm>
-      </p:grpSpPr>
-    </p:spTree>
-  </p:cSld>
-  <p:clrMapOvr>
-    <a:masterClrMapping/>
-  </p:clrMapOvr>
-</p:sld>
-</file>
-
-<file path=ppt/slides/slide13.xml><?xml version="1.0" encoding="utf-8"?>
-<p:sld xmlns:a="http://schemas.openxmlformats.org/drawingml/2006/main" xmlns:r="http://schemas.openxmlformats.org/officeDocument/2006/relationships" xmlns:p="http://schemas.openxmlformats.org/presentationml/2006/main">
-  <p:cSld name="Slide 13">
-    <p:bg>
-      <p:bgPr>
-        <a:blipFill dpi="0" rotWithShape="1">
-          <a:blip r:embed="rId1">
-            <a:lum/>
-          </a:blip>
-          <a:srcRect/>
-          <a:stretch>
-            <a:fillRect/>
-          </a:stretch>
-        </a:blipFill>
-        <a:effectLst/>
-      </p:bgPr>
-    </p:bg>
-    <p:spTree>
-      <p:nvGrpSpPr>
-        <p:cNvPr id="1" name=""/>
-        <p:cNvGrpSpPr/>
-        <p:nvPr/>
-      </p:nvGrpSpPr>
-      <p:grpSpPr>
-        <a:xfrm>
-          <a:off x="0" y="0"/>
-          <a:ext cx="0" cy="0"/>
-          <a:chOff x="0" y="0"/>
-          <a:chExt cx="0" cy="0"/>
-        </a:xfrm>
-      </p:grpSpPr>
-    </p:spTree>
-  </p:cSld>
-  <p:clrMapOvr>
-    <a:masterClrMapping/>
-  </p:clrMapOvr>
-</p:sld>
-</file>
-
-<file path=ppt/slides/slide14.xml><?xml version="1.0" encoding="utf-8"?>
-<p:sld xmlns:a="http://schemas.openxmlformats.org/drawingml/2006/main" xmlns:r="http://schemas.openxmlformats.org/officeDocument/2006/relationships" xmlns:p="http://schemas.openxmlformats.org/presentationml/2006/main">
-  <p:cSld name="Slide 14">
     <p:bg>
       <p:bgPr>
         <a:blipFill dpi="0" rotWithShape="1">
@@ -2515,45 +1786,6 @@
 </p:sld>
 </file>
 
-<file path=ppt/slides/slide9.xml><?xml version="1.0" encoding="utf-8"?>
-<p:sld xmlns:a="http://schemas.openxmlformats.org/drawingml/2006/main" xmlns:r="http://schemas.openxmlformats.org/officeDocument/2006/relationships" xmlns:p="http://schemas.openxmlformats.org/presentationml/2006/main">
-  <p:cSld name="Slide 9">
-    <p:bg>
-      <p:bgPr>
-        <a:blipFill dpi="0" rotWithShape="1">
-          <a:blip r:embed="rId1">
-            <a:lum/>
-          </a:blip>
-          <a:srcRect/>
-          <a:stretch>
-            <a:fillRect/>
-          </a:stretch>
-        </a:blipFill>
-        <a:effectLst/>
-      </p:bgPr>
-    </p:bg>
-    <p:spTree>
-      <p:nvGrpSpPr>
-        <p:cNvPr id="1" name=""/>
-        <p:cNvGrpSpPr/>
-        <p:nvPr/>
-      </p:nvGrpSpPr>
-      <p:grpSpPr>
-        <a:xfrm>
-          <a:off x="0" y="0"/>
-          <a:ext cx="0" cy="0"/>
-          <a:chOff x="0" y="0"/>
-          <a:chExt cx="0" cy="0"/>
-        </a:xfrm>
-      </p:grpSpPr>
-    </p:spTree>
-  </p:cSld>
-  <p:clrMapOvr>
-    <a:masterClrMapping/>
-  </p:clrMapOvr>
-</p:sld>
-</file>
-
 <file path=ppt/theme/theme1.xml><?xml version="1.0" encoding="utf-8"?>
 <a:theme xmlns:a="http://schemas.openxmlformats.org/drawingml/2006/main" name="Office Theme">
   <a:themeElements>

</xml_diff>

<commit_message>
Deploying to gh-pages from @ HinnyTsang/presentation-mcf-project@816d43f80861302ce6c9a9f72cd3d88911f54d80 🚀
</commit_message>
<xml_diff>
--- a/README.pptx
+++ b/README.pptx
@@ -6,16 +6,9 @@
   </p:sldMasterIdLst>
   <p:sldIdLst>
     <p:sldId id="256" r:id="rId2"/>
-    <p:sldId id="257" r:id="rId3"/>
-    <p:sldId id="258" r:id="rId4"/>
-    <p:sldId id="259" r:id="rId5"/>
-    <p:sldId id="260" r:id="rId6"/>
-    <p:sldId id="261" r:id="rId7"/>
-    <p:sldId id="262" r:id="rId8"/>
-    <p:sldId id="263" r:id="rId9"/>
   </p:sldIdLst>
   <p:notesMasterIdLst>
-    <p:notesMasterId r:id="rId10"/>
+    <p:notesMasterId r:id="rId3"/>
   </p:notesMasterIdLst>
   <p:sldSz cx="12192000" cy="6858000"/>
   <p:notesSz cx="6858000" cy="12192000"/>
@@ -551,622 +544,6 @@
 </p:notes>
 </file>
 
-<file path=ppt/notesSlides/notesSlide2.xml><?xml version="1.0" encoding="utf-8"?>
-<p:notes xmlns:a="http://schemas.openxmlformats.org/drawingml/2006/main" xmlns:r="http://schemas.openxmlformats.org/officeDocument/2006/relationships" xmlns:p="http://schemas.openxmlformats.org/presentationml/2006/main">
-  <p:cSld>
-    <p:spTree>
-      <p:nvGrpSpPr>
-        <p:cNvPr id="1" name=""/>
-        <p:cNvGrpSpPr/>
-        <p:nvPr/>
-      </p:nvGrpSpPr>
-      <p:grpSpPr>
-        <a:xfrm>
-          <a:off x="0" y="0"/>
-          <a:ext cx="0" cy="0"/>
-          <a:chOff x="0" y="0"/>
-          <a:chExt cx="0" cy="0"/>
-        </a:xfrm>
-      </p:grpSpPr>
-      <p:sp>
-        <p:nvSpPr>
-          <p:cNvPr id="2" name="Slide Image Placeholder 1"/>
-          <p:cNvSpPr>
-            <a:spLocks noGrp="1" noRot="1" noChangeAspect="1"/>
-          </p:cNvSpPr>
-          <p:nvPr>
-            <p:ph type="sldImg"/>
-          </p:nvPr>
-        </p:nvSpPr>
-        <p:spPr/>
-      </p:sp>
-      <p:sp>
-        <p:nvSpPr>
-          <p:cNvPr id="3" name="Notes Placeholder 2"/>
-          <p:cNvSpPr>
-            <a:spLocks noGrp="1"/>
-          </p:cNvSpPr>
-          <p:nvPr>
-            <p:ph type="body" idx="1"/>
-          </p:nvPr>
-        </p:nvSpPr>
-        <p:spPr/>
-        <p:txBody>
-          <a:bodyPr/>
-          <a:lstStyle/>
-          <a:p>
-            <a:r>
-              <a:rPr lang="en-US" dirty="0"/>
-              <a:t/>
-            </a:r>
-            <a:endParaRPr lang="en-US" dirty="0"/>
-          </a:p>
-        </p:txBody>
-      </p:sp>
-      <p:sp>
-        <p:nvSpPr>
-          <p:cNvPr id="4" name="Slide Number Placeholder 3"/>
-          <p:cNvSpPr>
-            <a:spLocks noGrp="1"/>
-          </p:cNvSpPr>
-          <p:nvPr>
-            <p:ph type="sldNum" sz="quarter" idx="10"/>
-          </p:nvPr>
-        </p:nvSpPr>
-        <p:spPr/>
-        <p:txBody>
-          <a:bodyPr/>
-          <a:lstStyle/>
-          <a:p>
-            <a:fld id="{F7021451-1387-4CA6-816F-3879F97B5CBC}" type="slidenum">
-              <a:rPr lang="en-US"/>
-              <a:t>2</a:t>
-            </a:fld>
-            <a:endParaRPr lang="en-US"/>
-          </a:p>
-        </p:txBody>
-      </p:sp>
-    </p:spTree>
-    <p:extLst>
-      <p:ext uri="{BB962C8B-B14F-4D97-AF65-F5344CB8AC3E}">
-        <p14:creationId xmlns:p14="http://schemas.microsoft.com/office/powerpoint/2010/main" val="1024086991"/>
-      </p:ext>
-    </p:extLst>
-  </p:cSld>
-  <p:clrMapOvr>
-    <a:masterClrMapping/>
-  </p:clrMapOvr>
-</p:notes>
-</file>
-
-<file path=ppt/notesSlides/notesSlide3.xml><?xml version="1.0" encoding="utf-8"?>
-<p:notes xmlns:a="http://schemas.openxmlformats.org/drawingml/2006/main" xmlns:r="http://schemas.openxmlformats.org/officeDocument/2006/relationships" xmlns:p="http://schemas.openxmlformats.org/presentationml/2006/main">
-  <p:cSld>
-    <p:spTree>
-      <p:nvGrpSpPr>
-        <p:cNvPr id="1" name=""/>
-        <p:cNvGrpSpPr/>
-        <p:nvPr/>
-      </p:nvGrpSpPr>
-      <p:grpSpPr>
-        <a:xfrm>
-          <a:off x="0" y="0"/>
-          <a:ext cx="0" cy="0"/>
-          <a:chOff x="0" y="0"/>
-          <a:chExt cx="0" cy="0"/>
-        </a:xfrm>
-      </p:grpSpPr>
-      <p:sp>
-        <p:nvSpPr>
-          <p:cNvPr id="2" name="Slide Image Placeholder 1"/>
-          <p:cNvSpPr>
-            <a:spLocks noGrp="1" noRot="1" noChangeAspect="1"/>
-          </p:cNvSpPr>
-          <p:nvPr>
-            <p:ph type="sldImg"/>
-          </p:nvPr>
-        </p:nvSpPr>
-        <p:spPr/>
-      </p:sp>
-      <p:sp>
-        <p:nvSpPr>
-          <p:cNvPr id="3" name="Notes Placeholder 2"/>
-          <p:cNvSpPr>
-            <a:spLocks noGrp="1"/>
-          </p:cNvSpPr>
-          <p:nvPr>
-            <p:ph type="body" idx="1"/>
-          </p:nvPr>
-        </p:nvSpPr>
-        <p:spPr/>
-        <p:txBody>
-          <a:bodyPr/>
-          <a:lstStyle/>
-          <a:p>
-            <a:r>
-              <a:rPr lang="en-US" dirty="0"/>
-              <a:t>Too Basic</a:t>
-            </a:r>
-            <a:endParaRPr lang="en-US" dirty="0"/>
-          </a:p>
-        </p:txBody>
-      </p:sp>
-      <p:sp>
-        <p:nvSpPr>
-          <p:cNvPr id="4" name="Slide Number Placeholder 3"/>
-          <p:cNvSpPr>
-            <a:spLocks noGrp="1"/>
-          </p:cNvSpPr>
-          <p:nvPr>
-            <p:ph type="sldNum" sz="quarter" idx="10"/>
-          </p:nvPr>
-        </p:nvSpPr>
-        <p:spPr/>
-        <p:txBody>
-          <a:bodyPr/>
-          <a:lstStyle/>
-          <a:p>
-            <a:fld id="{F7021451-1387-4CA6-816F-3879F97B5CBC}" type="slidenum">
-              <a:rPr lang="en-US"/>
-              <a:t>3</a:t>
-            </a:fld>
-            <a:endParaRPr lang="en-US"/>
-          </a:p>
-        </p:txBody>
-      </p:sp>
-    </p:spTree>
-    <p:extLst>
-      <p:ext uri="{BB962C8B-B14F-4D97-AF65-F5344CB8AC3E}">
-        <p14:creationId xmlns:p14="http://schemas.microsoft.com/office/powerpoint/2010/main" val="1024086991"/>
-      </p:ext>
-    </p:extLst>
-  </p:cSld>
-  <p:clrMapOvr>
-    <a:masterClrMapping/>
-  </p:clrMapOvr>
-</p:notes>
-</file>
-
-<file path=ppt/notesSlides/notesSlide4.xml><?xml version="1.0" encoding="utf-8"?>
-<p:notes xmlns:a="http://schemas.openxmlformats.org/drawingml/2006/main" xmlns:r="http://schemas.openxmlformats.org/officeDocument/2006/relationships" xmlns:p="http://schemas.openxmlformats.org/presentationml/2006/main">
-  <p:cSld>
-    <p:spTree>
-      <p:nvGrpSpPr>
-        <p:cNvPr id="1" name=""/>
-        <p:cNvGrpSpPr/>
-        <p:nvPr/>
-      </p:nvGrpSpPr>
-      <p:grpSpPr>
-        <a:xfrm>
-          <a:off x="0" y="0"/>
-          <a:ext cx="0" cy="0"/>
-          <a:chOff x="0" y="0"/>
-          <a:chExt cx="0" cy="0"/>
-        </a:xfrm>
-      </p:grpSpPr>
-      <p:sp>
-        <p:nvSpPr>
-          <p:cNvPr id="2" name="Slide Image Placeholder 1"/>
-          <p:cNvSpPr>
-            <a:spLocks noGrp="1" noRot="1" noChangeAspect="1"/>
-          </p:cNvSpPr>
-          <p:nvPr>
-            <p:ph type="sldImg"/>
-          </p:nvPr>
-        </p:nvSpPr>
-        <p:spPr/>
-      </p:sp>
-      <p:sp>
-        <p:nvSpPr>
-          <p:cNvPr id="3" name="Notes Placeholder 2"/>
-          <p:cNvSpPr>
-            <a:spLocks noGrp="1"/>
-          </p:cNvSpPr>
-          <p:nvPr>
-            <p:ph type="body" idx="1"/>
-          </p:nvPr>
-        </p:nvSpPr>
-        <p:spPr/>
-        <p:txBody>
-          <a:bodyPr/>
-          <a:lstStyle/>
-          <a:p>
-            <a:r>
-              <a:rPr lang="en-US" dirty="0"/>
-              <a:t/>
-            </a:r>
-            <a:endParaRPr lang="en-US" dirty="0"/>
-          </a:p>
-        </p:txBody>
-      </p:sp>
-      <p:sp>
-        <p:nvSpPr>
-          <p:cNvPr id="4" name="Slide Number Placeholder 3"/>
-          <p:cNvSpPr>
-            <a:spLocks noGrp="1"/>
-          </p:cNvSpPr>
-          <p:nvPr>
-            <p:ph type="sldNum" sz="quarter" idx="10"/>
-          </p:nvPr>
-        </p:nvSpPr>
-        <p:spPr/>
-        <p:txBody>
-          <a:bodyPr/>
-          <a:lstStyle/>
-          <a:p>
-            <a:fld id="{F7021451-1387-4CA6-816F-3879F97B5CBC}" type="slidenum">
-              <a:rPr lang="en-US"/>
-              <a:t>4</a:t>
-            </a:fld>
-            <a:endParaRPr lang="en-US"/>
-          </a:p>
-        </p:txBody>
-      </p:sp>
-    </p:spTree>
-    <p:extLst>
-      <p:ext uri="{BB962C8B-B14F-4D97-AF65-F5344CB8AC3E}">
-        <p14:creationId xmlns:p14="http://schemas.microsoft.com/office/powerpoint/2010/main" val="1024086991"/>
-      </p:ext>
-    </p:extLst>
-  </p:cSld>
-  <p:clrMapOvr>
-    <a:masterClrMapping/>
-  </p:clrMapOvr>
-</p:notes>
-</file>
-
-<file path=ppt/notesSlides/notesSlide5.xml><?xml version="1.0" encoding="utf-8"?>
-<p:notes xmlns:a="http://schemas.openxmlformats.org/drawingml/2006/main" xmlns:r="http://schemas.openxmlformats.org/officeDocument/2006/relationships" xmlns:p="http://schemas.openxmlformats.org/presentationml/2006/main">
-  <p:cSld>
-    <p:spTree>
-      <p:nvGrpSpPr>
-        <p:cNvPr id="1" name=""/>
-        <p:cNvGrpSpPr/>
-        <p:nvPr/>
-      </p:nvGrpSpPr>
-      <p:grpSpPr>
-        <a:xfrm>
-          <a:off x="0" y="0"/>
-          <a:ext cx="0" cy="0"/>
-          <a:chOff x="0" y="0"/>
-          <a:chExt cx="0" cy="0"/>
-        </a:xfrm>
-      </p:grpSpPr>
-      <p:sp>
-        <p:nvSpPr>
-          <p:cNvPr id="2" name="Slide Image Placeholder 1"/>
-          <p:cNvSpPr>
-            <a:spLocks noGrp="1" noRot="1" noChangeAspect="1"/>
-          </p:cNvSpPr>
-          <p:nvPr>
-            <p:ph type="sldImg"/>
-          </p:nvPr>
-        </p:nvSpPr>
-        <p:spPr/>
-      </p:sp>
-      <p:sp>
-        <p:nvSpPr>
-          <p:cNvPr id="3" name="Notes Placeholder 2"/>
-          <p:cNvSpPr>
-            <a:spLocks noGrp="1"/>
-          </p:cNvSpPr>
-          <p:nvPr>
-            <p:ph type="body" idx="1"/>
-          </p:nvPr>
-        </p:nvSpPr>
-        <p:spPr/>
-        <p:txBody>
-          <a:bodyPr/>
-          <a:lstStyle/>
-          <a:p>
-            <a:r>
-              <a:rPr lang="en-US" dirty="0"/>
-              <a:t>Logic flow</a:t>
-            </a:r>
-            <a:endParaRPr lang="en-US" dirty="0"/>
-          </a:p>
-        </p:txBody>
-      </p:sp>
-      <p:sp>
-        <p:nvSpPr>
-          <p:cNvPr id="4" name="Slide Number Placeholder 3"/>
-          <p:cNvSpPr>
-            <a:spLocks noGrp="1"/>
-          </p:cNvSpPr>
-          <p:nvPr>
-            <p:ph type="sldNum" sz="quarter" idx="10"/>
-          </p:nvPr>
-        </p:nvSpPr>
-        <p:spPr/>
-        <p:txBody>
-          <a:bodyPr/>
-          <a:lstStyle/>
-          <a:p>
-            <a:fld id="{F7021451-1387-4CA6-816F-3879F97B5CBC}" type="slidenum">
-              <a:rPr lang="en-US"/>
-              <a:t>5</a:t>
-            </a:fld>
-            <a:endParaRPr lang="en-US"/>
-          </a:p>
-        </p:txBody>
-      </p:sp>
-    </p:spTree>
-    <p:extLst>
-      <p:ext uri="{BB962C8B-B14F-4D97-AF65-F5344CB8AC3E}">
-        <p14:creationId xmlns:p14="http://schemas.microsoft.com/office/powerpoint/2010/main" val="1024086991"/>
-      </p:ext>
-    </p:extLst>
-  </p:cSld>
-  <p:clrMapOvr>
-    <a:masterClrMapping/>
-  </p:clrMapOvr>
-</p:notes>
-</file>
-
-<file path=ppt/notesSlides/notesSlide6.xml><?xml version="1.0" encoding="utf-8"?>
-<p:notes xmlns:a="http://schemas.openxmlformats.org/drawingml/2006/main" xmlns:r="http://schemas.openxmlformats.org/officeDocument/2006/relationships" xmlns:p="http://schemas.openxmlformats.org/presentationml/2006/main">
-  <p:cSld>
-    <p:spTree>
-      <p:nvGrpSpPr>
-        <p:cNvPr id="1" name=""/>
-        <p:cNvGrpSpPr/>
-        <p:nvPr/>
-      </p:nvGrpSpPr>
-      <p:grpSpPr>
-        <a:xfrm>
-          <a:off x="0" y="0"/>
-          <a:ext cx="0" cy="0"/>
-          <a:chOff x="0" y="0"/>
-          <a:chExt cx="0" cy="0"/>
-        </a:xfrm>
-      </p:grpSpPr>
-      <p:sp>
-        <p:nvSpPr>
-          <p:cNvPr id="2" name="Slide Image Placeholder 1"/>
-          <p:cNvSpPr>
-            <a:spLocks noGrp="1" noRot="1" noChangeAspect="1"/>
-          </p:cNvSpPr>
-          <p:nvPr>
-            <p:ph type="sldImg"/>
-          </p:nvPr>
-        </p:nvSpPr>
-        <p:spPr/>
-      </p:sp>
-      <p:sp>
-        <p:nvSpPr>
-          <p:cNvPr id="3" name="Notes Placeholder 2"/>
-          <p:cNvSpPr>
-            <a:spLocks noGrp="1"/>
-          </p:cNvSpPr>
-          <p:nvPr>
-            <p:ph type="body" idx="1"/>
-          </p:nvPr>
-        </p:nvSpPr>
-        <p:spPr/>
-        <p:txBody>
-          <a:bodyPr/>
-          <a:lstStyle/>
-          <a:p>
-            <a:r>
-              <a:rPr lang="en-US" dirty="0"/>
-              <a:t/>
-            </a:r>
-            <a:endParaRPr lang="en-US" dirty="0"/>
-          </a:p>
-        </p:txBody>
-      </p:sp>
-      <p:sp>
-        <p:nvSpPr>
-          <p:cNvPr id="4" name="Slide Number Placeholder 3"/>
-          <p:cNvSpPr>
-            <a:spLocks noGrp="1"/>
-          </p:cNvSpPr>
-          <p:nvPr>
-            <p:ph type="sldNum" sz="quarter" idx="10"/>
-          </p:nvPr>
-        </p:nvSpPr>
-        <p:spPr/>
-        <p:txBody>
-          <a:bodyPr/>
-          <a:lstStyle/>
-          <a:p>
-            <a:fld id="{F7021451-1387-4CA6-816F-3879F97B5CBC}" type="slidenum">
-              <a:rPr lang="en-US"/>
-              <a:t>6</a:t>
-            </a:fld>
-            <a:endParaRPr lang="en-US"/>
-          </a:p>
-        </p:txBody>
-      </p:sp>
-    </p:spTree>
-    <p:extLst>
-      <p:ext uri="{BB962C8B-B14F-4D97-AF65-F5344CB8AC3E}">
-        <p14:creationId xmlns:p14="http://schemas.microsoft.com/office/powerpoint/2010/main" val="1024086991"/>
-      </p:ext>
-    </p:extLst>
-  </p:cSld>
-  <p:clrMapOvr>
-    <a:masterClrMapping/>
-  </p:clrMapOvr>
-</p:notes>
-</file>
-
-<file path=ppt/notesSlides/notesSlide7.xml><?xml version="1.0" encoding="utf-8"?>
-<p:notes xmlns:a="http://schemas.openxmlformats.org/drawingml/2006/main" xmlns:r="http://schemas.openxmlformats.org/officeDocument/2006/relationships" xmlns:p="http://schemas.openxmlformats.org/presentationml/2006/main">
-  <p:cSld>
-    <p:spTree>
-      <p:nvGrpSpPr>
-        <p:cNvPr id="1" name=""/>
-        <p:cNvGrpSpPr/>
-        <p:nvPr/>
-      </p:nvGrpSpPr>
-      <p:grpSpPr>
-        <a:xfrm>
-          <a:off x="0" y="0"/>
-          <a:ext cx="0" cy="0"/>
-          <a:chOff x="0" y="0"/>
-          <a:chExt cx="0" cy="0"/>
-        </a:xfrm>
-      </p:grpSpPr>
-      <p:sp>
-        <p:nvSpPr>
-          <p:cNvPr id="2" name="Slide Image Placeholder 1"/>
-          <p:cNvSpPr>
-            <a:spLocks noGrp="1" noRot="1" noChangeAspect="1"/>
-          </p:cNvSpPr>
-          <p:nvPr>
-            <p:ph type="sldImg"/>
-          </p:nvPr>
-        </p:nvSpPr>
-        <p:spPr/>
-      </p:sp>
-      <p:sp>
-        <p:nvSpPr>
-          <p:cNvPr id="3" name="Notes Placeholder 2"/>
-          <p:cNvSpPr>
-            <a:spLocks noGrp="1"/>
-          </p:cNvSpPr>
-          <p:nvPr>
-            <p:ph type="body" idx="1"/>
-          </p:nvPr>
-        </p:nvSpPr>
-        <p:spPr/>
-        <p:txBody>
-          <a:bodyPr/>
-          <a:lstStyle/>
-          <a:p>
-            <a:r>
-              <a:rPr lang="en-US" dirty="0"/>
-              <a:t/>
-            </a:r>
-            <a:endParaRPr lang="en-US" dirty="0"/>
-          </a:p>
-        </p:txBody>
-      </p:sp>
-      <p:sp>
-        <p:nvSpPr>
-          <p:cNvPr id="4" name="Slide Number Placeholder 3"/>
-          <p:cNvSpPr>
-            <a:spLocks noGrp="1"/>
-          </p:cNvSpPr>
-          <p:nvPr>
-            <p:ph type="sldNum" sz="quarter" idx="10"/>
-          </p:nvPr>
-        </p:nvSpPr>
-        <p:spPr/>
-        <p:txBody>
-          <a:bodyPr/>
-          <a:lstStyle/>
-          <a:p>
-            <a:fld id="{F7021451-1387-4CA6-816F-3879F97B5CBC}" type="slidenum">
-              <a:rPr lang="en-US"/>
-              <a:t>7</a:t>
-            </a:fld>
-            <a:endParaRPr lang="en-US"/>
-          </a:p>
-        </p:txBody>
-      </p:sp>
-    </p:spTree>
-    <p:extLst>
-      <p:ext uri="{BB962C8B-B14F-4D97-AF65-F5344CB8AC3E}">
-        <p14:creationId xmlns:p14="http://schemas.microsoft.com/office/powerpoint/2010/main" val="1024086991"/>
-      </p:ext>
-    </p:extLst>
-  </p:cSld>
-  <p:clrMapOvr>
-    <a:masterClrMapping/>
-  </p:clrMapOvr>
-</p:notes>
-</file>
-
-<file path=ppt/notesSlides/notesSlide8.xml><?xml version="1.0" encoding="utf-8"?>
-<p:notes xmlns:a="http://schemas.openxmlformats.org/drawingml/2006/main" xmlns:r="http://schemas.openxmlformats.org/officeDocument/2006/relationships" xmlns:p="http://schemas.openxmlformats.org/presentationml/2006/main">
-  <p:cSld>
-    <p:spTree>
-      <p:nvGrpSpPr>
-        <p:cNvPr id="1" name=""/>
-        <p:cNvGrpSpPr/>
-        <p:nvPr/>
-      </p:nvGrpSpPr>
-      <p:grpSpPr>
-        <a:xfrm>
-          <a:off x="0" y="0"/>
-          <a:ext cx="0" cy="0"/>
-          <a:chOff x="0" y="0"/>
-          <a:chExt cx="0" cy="0"/>
-        </a:xfrm>
-      </p:grpSpPr>
-      <p:sp>
-        <p:nvSpPr>
-          <p:cNvPr id="2" name="Slide Image Placeholder 1"/>
-          <p:cNvSpPr>
-            <a:spLocks noGrp="1" noRot="1" noChangeAspect="1"/>
-          </p:cNvSpPr>
-          <p:nvPr>
-            <p:ph type="sldImg"/>
-          </p:nvPr>
-        </p:nvSpPr>
-        <p:spPr/>
-      </p:sp>
-      <p:sp>
-        <p:nvSpPr>
-          <p:cNvPr id="3" name="Notes Placeholder 2"/>
-          <p:cNvSpPr>
-            <a:spLocks noGrp="1"/>
-          </p:cNvSpPr>
-          <p:nvPr>
-            <p:ph type="body" idx="1"/>
-          </p:nvPr>
-        </p:nvSpPr>
-        <p:spPr/>
-        <p:txBody>
-          <a:bodyPr/>
-          <a:lstStyle/>
-          <a:p>
-            <a:r>
-              <a:rPr lang="en-US" dirty="0"/>
-              <a:t/>
-            </a:r>
-            <a:endParaRPr lang="en-US" dirty="0"/>
-          </a:p>
-        </p:txBody>
-      </p:sp>
-      <p:sp>
-        <p:nvSpPr>
-          <p:cNvPr id="4" name="Slide Number Placeholder 3"/>
-          <p:cNvSpPr>
-            <a:spLocks noGrp="1"/>
-          </p:cNvSpPr>
-          <p:nvPr>
-            <p:ph type="sldNum" sz="quarter" idx="10"/>
-          </p:nvPr>
-        </p:nvSpPr>
-        <p:spPr/>
-        <p:txBody>
-          <a:bodyPr/>
-          <a:lstStyle/>
-          <a:p>
-            <a:fld id="{F7021451-1387-4CA6-816F-3879F97B5CBC}" type="slidenum">
-              <a:rPr lang="en-US"/>
-              <a:t>8</a:t>
-            </a:fld>
-            <a:endParaRPr lang="en-US"/>
-          </a:p>
-        </p:txBody>
-      </p:sp>
-    </p:spTree>
-    <p:extLst>
-      <p:ext uri="{BB962C8B-B14F-4D97-AF65-F5344CB8AC3E}">
-        <p14:creationId xmlns:p14="http://schemas.microsoft.com/office/powerpoint/2010/main" val="1024086991"/>
-      </p:ext>
-    </p:extLst>
-  </p:cSld>
-  <p:clrMapOvr>
-    <a:masterClrMapping/>
-  </p:clrMapOvr>
-</p:notes>
-</file>
-
 <file path=ppt/slideLayouts/slideLayout1.xml><?xml version="1.0" encoding="utf-8"?>
 <p:sldLayout xmlns:a="http://schemas.openxmlformats.org/drawingml/2006/main" xmlns:r="http://schemas.openxmlformats.org/officeDocument/2006/relationships" xmlns:p="http://schemas.openxmlformats.org/presentationml/2006/main" preserve="1">
   <p:cSld name="DEFAULT">
@@ -1477,279 +854,6 @@
 <file path=ppt/slides/slide1.xml><?xml version="1.0" encoding="utf-8"?>
 <p:sld xmlns:a="http://schemas.openxmlformats.org/drawingml/2006/main" xmlns:r="http://schemas.openxmlformats.org/officeDocument/2006/relationships" xmlns:p="http://schemas.openxmlformats.org/presentationml/2006/main">
   <p:cSld name="Slide 1">
-    <p:bg>
-      <p:bgPr>
-        <a:blipFill dpi="0" rotWithShape="1">
-          <a:blip r:embed="rId1">
-            <a:lum/>
-          </a:blip>
-          <a:srcRect/>
-          <a:stretch>
-            <a:fillRect/>
-          </a:stretch>
-        </a:blipFill>
-        <a:effectLst/>
-      </p:bgPr>
-    </p:bg>
-    <p:spTree>
-      <p:nvGrpSpPr>
-        <p:cNvPr id="1" name=""/>
-        <p:cNvGrpSpPr/>
-        <p:nvPr/>
-      </p:nvGrpSpPr>
-      <p:grpSpPr>
-        <a:xfrm>
-          <a:off x="0" y="0"/>
-          <a:ext cx="0" cy="0"/>
-          <a:chOff x="0" y="0"/>
-          <a:chExt cx="0" cy="0"/>
-        </a:xfrm>
-      </p:grpSpPr>
-    </p:spTree>
-  </p:cSld>
-  <p:clrMapOvr>
-    <a:masterClrMapping/>
-  </p:clrMapOvr>
-</p:sld>
-</file>
-
-<file path=ppt/slides/slide2.xml><?xml version="1.0" encoding="utf-8"?>
-<p:sld xmlns:a="http://schemas.openxmlformats.org/drawingml/2006/main" xmlns:r="http://schemas.openxmlformats.org/officeDocument/2006/relationships" xmlns:p="http://schemas.openxmlformats.org/presentationml/2006/main">
-  <p:cSld name="Slide 2">
-    <p:bg>
-      <p:bgPr>
-        <a:blipFill dpi="0" rotWithShape="1">
-          <a:blip r:embed="rId1">
-            <a:lum/>
-          </a:blip>
-          <a:srcRect/>
-          <a:stretch>
-            <a:fillRect/>
-          </a:stretch>
-        </a:blipFill>
-        <a:effectLst/>
-      </p:bgPr>
-    </p:bg>
-    <p:spTree>
-      <p:nvGrpSpPr>
-        <p:cNvPr id="1" name=""/>
-        <p:cNvGrpSpPr/>
-        <p:nvPr/>
-      </p:nvGrpSpPr>
-      <p:grpSpPr>
-        <a:xfrm>
-          <a:off x="0" y="0"/>
-          <a:ext cx="0" cy="0"/>
-          <a:chOff x="0" y="0"/>
-          <a:chExt cx="0" cy="0"/>
-        </a:xfrm>
-      </p:grpSpPr>
-    </p:spTree>
-  </p:cSld>
-  <p:clrMapOvr>
-    <a:masterClrMapping/>
-  </p:clrMapOvr>
-</p:sld>
-</file>
-
-<file path=ppt/slides/slide3.xml><?xml version="1.0" encoding="utf-8"?>
-<p:sld xmlns:a="http://schemas.openxmlformats.org/drawingml/2006/main" xmlns:r="http://schemas.openxmlformats.org/officeDocument/2006/relationships" xmlns:p="http://schemas.openxmlformats.org/presentationml/2006/main">
-  <p:cSld name="Slide 3">
-    <p:bg>
-      <p:bgPr>
-        <a:blipFill dpi="0" rotWithShape="1">
-          <a:blip r:embed="rId1">
-            <a:lum/>
-          </a:blip>
-          <a:srcRect/>
-          <a:stretch>
-            <a:fillRect/>
-          </a:stretch>
-        </a:blipFill>
-        <a:effectLst/>
-      </p:bgPr>
-    </p:bg>
-    <p:spTree>
-      <p:nvGrpSpPr>
-        <p:cNvPr id="1" name=""/>
-        <p:cNvGrpSpPr/>
-        <p:nvPr/>
-      </p:nvGrpSpPr>
-      <p:grpSpPr>
-        <a:xfrm>
-          <a:off x="0" y="0"/>
-          <a:ext cx="0" cy="0"/>
-          <a:chOff x="0" y="0"/>
-          <a:chExt cx="0" cy="0"/>
-        </a:xfrm>
-      </p:grpSpPr>
-    </p:spTree>
-  </p:cSld>
-  <p:clrMapOvr>
-    <a:masterClrMapping/>
-  </p:clrMapOvr>
-</p:sld>
-</file>
-
-<file path=ppt/slides/slide4.xml><?xml version="1.0" encoding="utf-8"?>
-<p:sld xmlns:a="http://schemas.openxmlformats.org/drawingml/2006/main" xmlns:r="http://schemas.openxmlformats.org/officeDocument/2006/relationships" xmlns:p="http://schemas.openxmlformats.org/presentationml/2006/main">
-  <p:cSld name="Slide 4">
-    <p:bg>
-      <p:bgPr>
-        <a:blipFill dpi="0" rotWithShape="1">
-          <a:blip r:embed="rId1">
-            <a:lum/>
-          </a:blip>
-          <a:srcRect/>
-          <a:stretch>
-            <a:fillRect/>
-          </a:stretch>
-        </a:blipFill>
-        <a:effectLst/>
-      </p:bgPr>
-    </p:bg>
-    <p:spTree>
-      <p:nvGrpSpPr>
-        <p:cNvPr id="1" name=""/>
-        <p:cNvGrpSpPr/>
-        <p:nvPr/>
-      </p:nvGrpSpPr>
-      <p:grpSpPr>
-        <a:xfrm>
-          <a:off x="0" y="0"/>
-          <a:ext cx="0" cy="0"/>
-          <a:chOff x="0" y="0"/>
-          <a:chExt cx="0" cy="0"/>
-        </a:xfrm>
-      </p:grpSpPr>
-    </p:spTree>
-  </p:cSld>
-  <p:clrMapOvr>
-    <a:masterClrMapping/>
-  </p:clrMapOvr>
-</p:sld>
-</file>
-
-<file path=ppt/slides/slide5.xml><?xml version="1.0" encoding="utf-8"?>
-<p:sld xmlns:a="http://schemas.openxmlformats.org/drawingml/2006/main" xmlns:r="http://schemas.openxmlformats.org/officeDocument/2006/relationships" xmlns:p="http://schemas.openxmlformats.org/presentationml/2006/main">
-  <p:cSld name="Slide 5">
-    <p:bg>
-      <p:bgPr>
-        <a:blipFill dpi="0" rotWithShape="1">
-          <a:blip r:embed="rId1">
-            <a:lum/>
-          </a:blip>
-          <a:srcRect/>
-          <a:stretch>
-            <a:fillRect/>
-          </a:stretch>
-        </a:blipFill>
-        <a:effectLst/>
-      </p:bgPr>
-    </p:bg>
-    <p:spTree>
-      <p:nvGrpSpPr>
-        <p:cNvPr id="1" name=""/>
-        <p:cNvGrpSpPr/>
-        <p:nvPr/>
-      </p:nvGrpSpPr>
-      <p:grpSpPr>
-        <a:xfrm>
-          <a:off x="0" y="0"/>
-          <a:ext cx="0" cy="0"/>
-          <a:chOff x="0" y="0"/>
-          <a:chExt cx="0" cy="0"/>
-        </a:xfrm>
-      </p:grpSpPr>
-    </p:spTree>
-  </p:cSld>
-  <p:clrMapOvr>
-    <a:masterClrMapping/>
-  </p:clrMapOvr>
-</p:sld>
-</file>
-
-<file path=ppt/slides/slide6.xml><?xml version="1.0" encoding="utf-8"?>
-<p:sld xmlns:a="http://schemas.openxmlformats.org/drawingml/2006/main" xmlns:r="http://schemas.openxmlformats.org/officeDocument/2006/relationships" xmlns:p="http://schemas.openxmlformats.org/presentationml/2006/main">
-  <p:cSld name="Slide 6">
-    <p:bg>
-      <p:bgPr>
-        <a:blipFill dpi="0" rotWithShape="1">
-          <a:blip r:embed="rId1">
-            <a:lum/>
-          </a:blip>
-          <a:srcRect/>
-          <a:stretch>
-            <a:fillRect/>
-          </a:stretch>
-        </a:blipFill>
-        <a:effectLst/>
-      </p:bgPr>
-    </p:bg>
-    <p:spTree>
-      <p:nvGrpSpPr>
-        <p:cNvPr id="1" name=""/>
-        <p:cNvGrpSpPr/>
-        <p:nvPr/>
-      </p:nvGrpSpPr>
-      <p:grpSpPr>
-        <a:xfrm>
-          <a:off x="0" y="0"/>
-          <a:ext cx="0" cy="0"/>
-          <a:chOff x="0" y="0"/>
-          <a:chExt cx="0" cy="0"/>
-        </a:xfrm>
-      </p:grpSpPr>
-    </p:spTree>
-  </p:cSld>
-  <p:clrMapOvr>
-    <a:masterClrMapping/>
-  </p:clrMapOvr>
-</p:sld>
-</file>
-
-<file path=ppt/slides/slide7.xml><?xml version="1.0" encoding="utf-8"?>
-<p:sld xmlns:a="http://schemas.openxmlformats.org/drawingml/2006/main" xmlns:r="http://schemas.openxmlformats.org/officeDocument/2006/relationships" xmlns:p="http://schemas.openxmlformats.org/presentationml/2006/main">
-  <p:cSld name="Slide 7">
-    <p:bg>
-      <p:bgPr>
-        <a:blipFill dpi="0" rotWithShape="1">
-          <a:blip r:embed="rId1">
-            <a:lum/>
-          </a:blip>
-          <a:srcRect/>
-          <a:stretch>
-            <a:fillRect/>
-          </a:stretch>
-        </a:blipFill>
-        <a:effectLst/>
-      </p:bgPr>
-    </p:bg>
-    <p:spTree>
-      <p:nvGrpSpPr>
-        <p:cNvPr id="1" name=""/>
-        <p:cNvGrpSpPr/>
-        <p:nvPr/>
-      </p:nvGrpSpPr>
-      <p:grpSpPr>
-        <a:xfrm>
-          <a:off x="0" y="0"/>
-          <a:ext cx="0" cy="0"/>
-          <a:chOff x="0" y="0"/>
-          <a:chExt cx="0" cy="0"/>
-        </a:xfrm>
-      </p:grpSpPr>
-    </p:spTree>
-  </p:cSld>
-  <p:clrMapOvr>
-    <a:masterClrMapping/>
-  </p:clrMapOvr>
-</p:sld>
-</file>
-
-<file path=ppt/slides/slide8.xml><?xml version="1.0" encoding="utf-8"?>
-<p:sld xmlns:a="http://schemas.openxmlformats.org/drawingml/2006/main" xmlns:r="http://schemas.openxmlformats.org/officeDocument/2006/relationships" xmlns:p="http://schemas.openxmlformats.org/presentationml/2006/main">
-  <p:cSld name="Slide 8">
     <p:bg>
       <p:bgPr>
         <a:blipFill dpi="0" rotWithShape="1">

</xml_diff>

<commit_message>
Deploying to gh-pages from @ HinnyTsang/presentation-mcf-project@b5fb5ace0fc7337d914c88d844944257caafee6b 🚀
</commit_message>
<xml_diff>
--- a/README.pptx
+++ b/README.pptx
@@ -6,16 +6,9 @@
   </p:sldMasterIdLst>
   <p:sldIdLst>
     <p:sldId id="256" r:id="rId2"/>
-    <p:sldId id="257" r:id="rId3"/>
-    <p:sldId id="258" r:id="rId4"/>
-    <p:sldId id="259" r:id="rId5"/>
-    <p:sldId id="260" r:id="rId6"/>
-    <p:sldId id="261" r:id="rId7"/>
-    <p:sldId id="262" r:id="rId8"/>
-    <p:sldId id="263" r:id="rId9"/>
   </p:sldIdLst>
   <p:notesMasterIdLst>
-    <p:notesMasterId r:id="rId10"/>
+    <p:notesMasterId r:id="rId3"/>
   </p:notesMasterIdLst>
   <p:sldSz cx="12192000" cy="6858000"/>
   <p:notesSz cx="6858000" cy="12192000"/>
@@ -551,622 +544,6 @@
 </p:notes>
 </file>
 
-<file path=ppt/notesSlides/notesSlide2.xml><?xml version="1.0" encoding="utf-8"?>
-<p:notes xmlns:a="http://schemas.openxmlformats.org/drawingml/2006/main" xmlns:r="http://schemas.openxmlformats.org/officeDocument/2006/relationships" xmlns:p="http://schemas.openxmlformats.org/presentationml/2006/main">
-  <p:cSld>
-    <p:spTree>
-      <p:nvGrpSpPr>
-        <p:cNvPr id="1" name=""/>
-        <p:cNvGrpSpPr/>
-        <p:nvPr/>
-      </p:nvGrpSpPr>
-      <p:grpSpPr>
-        <a:xfrm>
-          <a:off x="0" y="0"/>
-          <a:ext cx="0" cy="0"/>
-          <a:chOff x="0" y="0"/>
-          <a:chExt cx="0" cy="0"/>
-        </a:xfrm>
-      </p:grpSpPr>
-      <p:sp>
-        <p:nvSpPr>
-          <p:cNvPr id="2" name="Slide Image Placeholder 1"/>
-          <p:cNvSpPr>
-            <a:spLocks noGrp="1" noRot="1" noChangeAspect="1"/>
-          </p:cNvSpPr>
-          <p:nvPr>
-            <p:ph type="sldImg"/>
-          </p:nvPr>
-        </p:nvSpPr>
-        <p:spPr/>
-      </p:sp>
-      <p:sp>
-        <p:nvSpPr>
-          <p:cNvPr id="3" name="Notes Placeholder 2"/>
-          <p:cNvSpPr>
-            <a:spLocks noGrp="1"/>
-          </p:cNvSpPr>
-          <p:nvPr>
-            <p:ph type="body" idx="1"/>
-          </p:nvPr>
-        </p:nvSpPr>
-        <p:spPr/>
-        <p:txBody>
-          <a:bodyPr/>
-          <a:lstStyle/>
-          <a:p>
-            <a:r>
-              <a:rPr lang="en-US" dirty="0"/>
-              <a:t/>
-            </a:r>
-            <a:endParaRPr lang="en-US" dirty="0"/>
-          </a:p>
-        </p:txBody>
-      </p:sp>
-      <p:sp>
-        <p:nvSpPr>
-          <p:cNvPr id="4" name="Slide Number Placeholder 3"/>
-          <p:cNvSpPr>
-            <a:spLocks noGrp="1"/>
-          </p:cNvSpPr>
-          <p:nvPr>
-            <p:ph type="sldNum" sz="quarter" idx="10"/>
-          </p:nvPr>
-        </p:nvSpPr>
-        <p:spPr/>
-        <p:txBody>
-          <a:bodyPr/>
-          <a:lstStyle/>
-          <a:p>
-            <a:fld id="{F7021451-1387-4CA6-816F-3879F97B5CBC}" type="slidenum">
-              <a:rPr lang="en-US"/>
-              <a:t>2</a:t>
-            </a:fld>
-            <a:endParaRPr lang="en-US"/>
-          </a:p>
-        </p:txBody>
-      </p:sp>
-    </p:spTree>
-    <p:extLst>
-      <p:ext uri="{BB962C8B-B14F-4D97-AF65-F5344CB8AC3E}">
-        <p14:creationId xmlns:p14="http://schemas.microsoft.com/office/powerpoint/2010/main" val="1024086991"/>
-      </p:ext>
-    </p:extLst>
-  </p:cSld>
-  <p:clrMapOvr>
-    <a:masterClrMapping/>
-  </p:clrMapOvr>
-</p:notes>
-</file>
-
-<file path=ppt/notesSlides/notesSlide3.xml><?xml version="1.0" encoding="utf-8"?>
-<p:notes xmlns:a="http://schemas.openxmlformats.org/drawingml/2006/main" xmlns:r="http://schemas.openxmlformats.org/officeDocument/2006/relationships" xmlns:p="http://schemas.openxmlformats.org/presentationml/2006/main">
-  <p:cSld>
-    <p:spTree>
-      <p:nvGrpSpPr>
-        <p:cNvPr id="1" name=""/>
-        <p:cNvGrpSpPr/>
-        <p:nvPr/>
-      </p:nvGrpSpPr>
-      <p:grpSpPr>
-        <a:xfrm>
-          <a:off x="0" y="0"/>
-          <a:ext cx="0" cy="0"/>
-          <a:chOff x="0" y="0"/>
-          <a:chExt cx="0" cy="0"/>
-        </a:xfrm>
-      </p:grpSpPr>
-      <p:sp>
-        <p:nvSpPr>
-          <p:cNvPr id="2" name="Slide Image Placeholder 1"/>
-          <p:cNvSpPr>
-            <a:spLocks noGrp="1" noRot="1" noChangeAspect="1"/>
-          </p:cNvSpPr>
-          <p:nvPr>
-            <p:ph type="sldImg"/>
-          </p:nvPr>
-        </p:nvSpPr>
-        <p:spPr/>
-      </p:sp>
-      <p:sp>
-        <p:nvSpPr>
-          <p:cNvPr id="3" name="Notes Placeholder 2"/>
-          <p:cNvSpPr>
-            <a:spLocks noGrp="1"/>
-          </p:cNvSpPr>
-          <p:nvPr>
-            <p:ph type="body" idx="1"/>
-          </p:nvPr>
-        </p:nvSpPr>
-        <p:spPr/>
-        <p:txBody>
-          <a:bodyPr/>
-          <a:lstStyle/>
-          <a:p>
-            <a:r>
-              <a:rPr lang="en-US" dirty="0"/>
-              <a:t>Too Basic</a:t>
-            </a:r>
-            <a:endParaRPr lang="en-US" dirty="0"/>
-          </a:p>
-        </p:txBody>
-      </p:sp>
-      <p:sp>
-        <p:nvSpPr>
-          <p:cNvPr id="4" name="Slide Number Placeholder 3"/>
-          <p:cNvSpPr>
-            <a:spLocks noGrp="1"/>
-          </p:cNvSpPr>
-          <p:nvPr>
-            <p:ph type="sldNum" sz="quarter" idx="10"/>
-          </p:nvPr>
-        </p:nvSpPr>
-        <p:spPr/>
-        <p:txBody>
-          <a:bodyPr/>
-          <a:lstStyle/>
-          <a:p>
-            <a:fld id="{F7021451-1387-4CA6-816F-3879F97B5CBC}" type="slidenum">
-              <a:rPr lang="en-US"/>
-              <a:t>3</a:t>
-            </a:fld>
-            <a:endParaRPr lang="en-US"/>
-          </a:p>
-        </p:txBody>
-      </p:sp>
-    </p:spTree>
-    <p:extLst>
-      <p:ext uri="{BB962C8B-B14F-4D97-AF65-F5344CB8AC3E}">
-        <p14:creationId xmlns:p14="http://schemas.microsoft.com/office/powerpoint/2010/main" val="1024086991"/>
-      </p:ext>
-    </p:extLst>
-  </p:cSld>
-  <p:clrMapOvr>
-    <a:masterClrMapping/>
-  </p:clrMapOvr>
-</p:notes>
-</file>
-
-<file path=ppt/notesSlides/notesSlide4.xml><?xml version="1.0" encoding="utf-8"?>
-<p:notes xmlns:a="http://schemas.openxmlformats.org/drawingml/2006/main" xmlns:r="http://schemas.openxmlformats.org/officeDocument/2006/relationships" xmlns:p="http://schemas.openxmlformats.org/presentationml/2006/main">
-  <p:cSld>
-    <p:spTree>
-      <p:nvGrpSpPr>
-        <p:cNvPr id="1" name=""/>
-        <p:cNvGrpSpPr/>
-        <p:nvPr/>
-      </p:nvGrpSpPr>
-      <p:grpSpPr>
-        <a:xfrm>
-          <a:off x="0" y="0"/>
-          <a:ext cx="0" cy="0"/>
-          <a:chOff x="0" y="0"/>
-          <a:chExt cx="0" cy="0"/>
-        </a:xfrm>
-      </p:grpSpPr>
-      <p:sp>
-        <p:nvSpPr>
-          <p:cNvPr id="2" name="Slide Image Placeholder 1"/>
-          <p:cNvSpPr>
-            <a:spLocks noGrp="1" noRot="1" noChangeAspect="1"/>
-          </p:cNvSpPr>
-          <p:nvPr>
-            <p:ph type="sldImg"/>
-          </p:nvPr>
-        </p:nvSpPr>
-        <p:spPr/>
-      </p:sp>
-      <p:sp>
-        <p:nvSpPr>
-          <p:cNvPr id="3" name="Notes Placeholder 2"/>
-          <p:cNvSpPr>
-            <a:spLocks noGrp="1"/>
-          </p:cNvSpPr>
-          <p:nvPr>
-            <p:ph type="body" idx="1"/>
-          </p:nvPr>
-        </p:nvSpPr>
-        <p:spPr/>
-        <p:txBody>
-          <a:bodyPr/>
-          <a:lstStyle/>
-          <a:p>
-            <a:r>
-              <a:rPr lang="en-US" dirty="0"/>
-              <a:t/>
-            </a:r>
-            <a:endParaRPr lang="en-US" dirty="0"/>
-          </a:p>
-        </p:txBody>
-      </p:sp>
-      <p:sp>
-        <p:nvSpPr>
-          <p:cNvPr id="4" name="Slide Number Placeholder 3"/>
-          <p:cNvSpPr>
-            <a:spLocks noGrp="1"/>
-          </p:cNvSpPr>
-          <p:nvPr>
-            <p:ph type="sldNum" sz="quarter" idx="10"/>
-          </p:nvPr>
-        </p:nvSpPr>
-        <p:spPr/>
-        <p:txBody>
-          <a:bodyPr/>
-          <a:lstStyle/>
-          <a:p>
-            <a:fld id="{F7021451-1387-4CA6-816F-3879F97B5CBC}" type="slidenum">
-              <a:rPr lang="en-US"/>
-              <a:t>4</a:t>
-            </a:fld>
-            <a:endParaRPr lang="en-US"/>
-          </a:p>
-        </p:txBody>
-      </p:sp>
-    </p:spTree>
-    <p:extLst>
-      <p:ext uri="{BB962C8B-B14F-4D97-AF65-F5344CB8AC3E}">
-        <p14:creationId xmlns:p14="http://schemas.microsoft.com/office/powerpoint/2010/main" val="1024086991"/>
-      </p:ext>
-    </p:extLst>
-  </p:cSld>
-  <p:clrMapOvr>
-    <a:masterClrMapping/>
-  </p:clrMapOvr>
-</p:notes>
-</file>
-
-<file path=ppt/notesSlides/notesSlide5.xml><?xml version="1.0" encoding="utf-8"?>
-<p:notes xmlns:a="http://schemas.openxmlformats.org/drawingml/2006/main" xmlns:r="http://schemas.openxmlformats.org/officeDocument/2006/relationships" xmlns:p="http://schemas.openxmlformats.org/presentationml/2006/main">
-  <p:cSld>
-    <p:spTree>
-      <p:nvGrpSpPr>
-        <p:cNvPr id="1" name=""/>
-        <p:cNvGrpSpPr/>
-        <p:nvPr/>
-      </p:nvGrpSpPr>
-      <p:grpSpPr>
-        <a:xfrm>
-          <a:off x="0" y="0"/>
-          <a:ext cx="0" cy="0"/>
-          <a:chOff x="0" y="0"/>
-          <a:chExt cx="0" cy="0"/>
-        </a:xfrm>
-      </p:grpSpPr>
-      <p:sp>
-        <p:nvSpPr>
-          <p:cNvPr id="2" name="Slide Image Placeholder 1"/>
-          <p:cNvSpPr>
-            <a:spLocks noGrp="1" noRot="1" noChangeAspect="1"/>
-          </p:cNvSpPr>
-          <p:nvPr>
-            <p:ph type="sldImg"/>
-          </p:nvPr>
-        </p:nvSpPr>
-        <p:spPr/>
-      </p:sp>
-      <p:sp>
-        <p:nvSpPr>
-          <p:cNvPr id="3" name="Notes Placeholder 2"/>
-          <p:cNvSpPr>
-            <a:spLocks noGrp="1"/>
-          </p:cNvSpPr>
-          <p:nvPr>
-            <p:ph type="body" idx="1"/>
-          </p:nvPr>
-        </p:nvSpPr>
-        <p:spPr/>
-        <p:txBody>
-          <a:bodyPr/>
-          <a:lstStyle/>
-          <a:p>
-            <a:r>
-              <a:rPr lang="en-US" dirty="0"/>
-              <a:t>Logic flow</a:t>
-            </a:r>
-            <a:endParaRPr lang="en-US" dirty="0"/>
-          </a:p>
-        </p:txBody>
-      </p:sp>
-      <p:sp>
-        <p:nvSpPr>
-          <p:cNvPr id="4" name="Slide Number Placeholder 3"/>
-          <p:cNvSpPr>
-            <a:spLocks noGrp="1"/>
-          </p:cNvSpPr>
-          <p:nvPr>
-            <p:ph type="sldNum" sz="quarter" idx="10"/>
-          </p:nvPr>
-        </p:nvSpPr>
-        <p:spPr/>
-        <p:txBody>
-          <a:bodyPr/>
-          <a:lstStyle/>
-          <a:p>
-            <a:fld id="{F7021451-1387-4CA6-816F-3879F97B5CBC}" type="slidenum">
-              <a:rPr lang="en-US"/>
-              <a:t>5</a:t>
-            </a:fld>
-            <a:endParaRPr lang="en-US"/>
-          </a:p>
-        </p:txBody>
-      </p:sp>
-    </p:spTree>
-    <p:extLst>
-      <p:ext uri="{BB962C8B-B14F-4D97-AF65-F5344CB8AC3E}">
-        <p14:creationId xmlns:p14="http://schemas.microsoft.com/office/powerpoint/2010/main" val="1024086991"/>
-      </p:ext>
-    </p:extLst>
-  </p:cSld>
-  <p:clrMapOvr>
-    <a:masterClrMapping/>
-  </p:clrMapOvr>
-</p:notes>
-</file>
-
-<file path=ppt/notesSlides/notesSlide6.xml><?xml version="1.0" encoding="utf-8"?>
-<p:notes xmlns:a="http://schemas.openxmlformats.org/drawingml/2006/main" xmlns:r="http://schemas.openxmlformats.org/officeDocument/2006/relationships" xmlns:p="http://schemas.openxmlformats.org/presentationml/2006/main">
-  <p:cSld>
-    <p:spTree>
-      <p:nvGrpSpPr>
-        <p:cNvPr id="1" name=""/>
-        <p:cNvGrpSpPr/>
-        <p:nvPr/>
-      </p:nvGrpSpPr>
-      <p:grpSpPr>
-        <a:xfrm>
-          <a:off x="0" y="0"/>
-          <a:ext cx="0" cy="0"/>
-          <a:chOff x="0" y="0"/>
-          <a:chExt cx="0" cy="0"/>
-        </a:xfrm>
-      </p:grpSpPr>
-      <p:sp>
-        <p:nvSpPr>
-          <p:cNvPr id="2" name="Slide Image Placeholder 1"/>
-          <p:cNvSpPr>
-            <a:spLocks noGrp="1" noRot="1" noChangeAspect="1"/>
-          </p:cNvSpPr>
-          <p:nvPr>
-            <p:ph type="sldImg"/>
-          </p:nvPr>
-        </p:nvSpPr>
-        <p:spPr/>
-      </p:sp>
-      <p:sp>
-        <p:nvSpPr>
-          <p:cNvPr id="3" name="Notes Placeholder 2"/>
-          <p:cNvSpPr>
-            <a:spLocks noGrp="1"/>
-          </p:cNvSpPr>
-          <p:nvPr>
-            <p:ph type="body" idx="1"/>
-          </p:nvPr>
-        </p:nvSpPr>
-        <p:spPr/>
-        <p:txBody>
-          <a:bodyPr/>
-          <a:lstStyle/>
-          <a:p>
-            <a:r>
-              <a:rPr lang="en-US" dirty="0"/>
-              <a:t/>
-            </a:r>
-            <a:endParaRPr lang="en-US" dirty="0"/>
-          </a:p>
-        </p:txBody>
-      </p:sp>
-      <p:sp>
-        <p:nvSpPr>
-          <p:cNvPr id="4" name="Slide Number Placeholder 3"/>
-          <p:cNvSpPr>
-            <a:spLocks noGrp="1"/>
-          </p:cNvSpPr>
-          <p:nvPr>
-            <p:ph type="sldNum" sz="quarter" idx="10"/>
-          </p:nvPr>
-        </p:nvSpPr>
-        <p:spPr/>
-        <p:txBody>
-          <a:bodyPr/>
-          <a:lstStyle/>
-          <a:p>
-            <a:fld id="{F7021451-1387-4CA6-816F-3879F97B5CBC}" type="slidenum">
-              <a:rPr lang="en-US"/>
-              <a:t>6</a:t>
-            </a:fld>
-            <a:endParaRPr lang="en-US"/>
-          </a:p>
-        </p:txBody>
-      </p:sp>
-    </p:spTree>
-    <p:extLst>
-      <p:ext uri="{BB962C8B-B14F-4D97-AF65-F5344CB8AC3E}">
-        <p14:creationId xmlns:p14="http://schemas.microsoft.com/office/powerpoint/2010/main" val="1024086991"/>
-      </p:ext>
-    </p:extLst>
-  </p:cSld>
-  <p:clrMapOvr>
-    <a:masterClrMapping/>
-  </p:clrMapOvr>
-</p:notes>
-</file>
-
-<file path=ppt/notesSlides/notesSlide7.xml><?xml version="1.0" encoding="utf-8"?>
-<p:notes xmlns:a="http://schemas.openxmlformats.org/drawingml/2006/main" xmlns:r="http://schemas.openxmlformats.org/officeDocument/2006/relationships" xmlns:p="http://schemas.openxmlformats.org/presentationml/2006/main">
-  <p:cSld>
-    <p:spTree>
-      <p:nvGrpSpPr>
-        <p:cNvPr id="1" name=""/>
-        <p:cNvGrpSpPr/>
-        <p:nvPr/>
-      </p:nvGrpSpPr>
-      <p:grpSpPr>
-        <a:xfrm>
-          <a:off x="0" y="0"/>
-          <a:ext cx="0" cy="0"/>
-          <a:chOff x="0" y="0"/>
-          <a:chExt cx="0" cy="0"/>
-        </a:xfrm>
-      </p:grpSpPr>
-      <p:sp>
-        <p:nvSpPr>
-          <p:cNvPr id="2" name="Slide Image Placeholder 1"/>
-          <p:cNvSpPr>
-            <a:spLocks noGrp="1" noRot="1" noChangeAspect="1"/>
-          </p:cNvSpPr>
-          <p:nvPr>
-            <p:ph type="sldImg"/>
-          </p:nvPr>
-        </p:nvSpPr>
-        <p:spPr/>
-      </p:sp>
-      <p:sp>
-        <p:nvSpPr>
-          <p:cNvPr id="3" name="Notes Placeholder 2"/>
-          <p:cNvSpPr>
-            <a:spLocks noGrp="1"/>
-          </p:cNvSpPr>
-          <p:nvPr>
-            <p:ph type="body" idx="1"/>
-          </p:nvPr>
-        </p:nvSpPr>
-        <p:spPr/>
-        <p:txBody>
-          <a:bodyPr/>
-          <a:lstStyle/>
-          <a:p>
-            <a:r>
-              <a:rPr lang="en-US" dirty="0"/>
-              <a:t/>
-            </a:r>
-            <a:endParaRPr lang="en-US" dirty="0"/>
-          </a:p>
-        </p:txBody>
-      </p:sp>
-      <p:sp>
-        <p:nvSpPr>
-          <p:cNvPr id="4" name="Slide Number Placeholder 3"/>
-          <p:cNvSpPr>
-            <a:spLocks noGrp="1"/>
-          </p:cNvSpPr>
-          <p:nvPr>
-            <p:ph type="sldNum" sz="quarter" idx="10"/>
-          </p:nvPr>
-        </p:nvSpPr>
-        <p:spPr/>
-        <p:txBody>
-          <a:bodyPr/>
-          <a:lstStyle/>
-          <a:p>
-            <a:fld id="{F7021451-1387-4CA6-816F-3879F97B5CBC}" type="slidenum">
-              <a:rPr lang="en-US"/>
-              <a:t>7</a:t>
-            </a:fld>
-            <a:endParaRPr lang="en-US"/>
-          </a:p>
-        </p:txBody>
-      </p:sp>
-    </p:spTree>
-    <p:extLst>
-      <p:ext uri="{BB962C8B-B14F-4D97-AF65-F5344CB8AC3E}">
-        <p14:creationId xmlns:p14="http://schemas.microsoft.com/office/powerpoint/2010/main" val="1024086991"/>
-      </p:ext>
-    </p:extLst>
-  </p:cSld>
-  <p:clrMapOvr>
-    <a:masterClrMapping/>
-  </p:clrMapOvr>
-</p:notes>
-</file>
-
-<file path=ppt/notesSlides/notesSlide8.xml><?xml version="1.0" encoding="utf-8"?>
-<p:notes xmlns:a="http://schemas.openxmlformats.org/drawingml/2006/main" xmlns:r="http://schemas.openxmlformats.org/officeDocument/2006/relationships" xmlns:p="http://schemas.openxmlformats.org/presentationml/2006/main">
-  <p:cSld>
-    <p:spTree>
-      <p:nvGrpSpPr>
-        <p:cNvPr id="1" name=""/>
-        <p:cNvGrpSpPr/>
-        <p:nvPr/>
-      </p:nvGrpSpPr>
-      <p:grpSpPr>
-        <a:xfrm>
-          <a:off x="0" y="0"/>
-          <a:ext cx="0" cy="0"/>
-          <a:chOff x="0" y="0"/>
-          <a:chExt cx="0" cy="0"/>
-        </a:xfrm>
-      </p:grpSpPr>
-      <p:sp>
-        <p:nvSpPr>
-          <p:cNvPr id="2" name="Slide Image Placeholder 1"/>
-          <p:cNvSpPr>
-            <a:spLocks noGrp="1" noRot="1" noChangeAspect="1"/>
-          </p:cNvSpPr>
-          <p:nvPr>
-            <p:ph type="sldImg"/>
-          </p:nvPr>
-        </p:nvSpPr>
-        <p:spPr/>
-      </p:sp>
-      <p:sp>
-        <p:nvSpPr>
-          <p:cNvPr id="3" name="Notes Placeholder 2"/>
-          <p:cNvSpPr>
-            <a:spLocks noGrp="1"/>
-          </p:cNvSpPr>
-          <p:nvPr>
-            <p:ph type="body" idx="1"/>
-          </p:nvPr>
-        </p:nvSpPr>
-        <p:spPr/>
-        <p:txBody>
-          <a:bodyPr/>
-          <a:lstStyle/>
-          <a:p>
-            <a:r>
-              <a:rPr lang="en-US" dirty="0"/>
-              <a:t/>
-            </a:r>
-            <a:endParaRPr lang="en-US" dirty="0"/>
-          </a:p>
-        </p:txBody>
-      </p:sp>
-      <p:sp>
-        <p:nvSpPr>
-          <p:cNvPr id="4" name="Slide Number Placeholder 3"/>
-          <p:cNvSpPr>
-            <a:spLocks noGrp="1"/>
-          </p:cNvSpPr>
-          <p:nvPr>
-            <p:ph type="sldNum" sz="quarter" idx="10"/>
-          </p:nvPr>
-        </p:nvSpPr>
-        <p:spPr/>
-        <p:txBody>
-          <a:bodyPr/>
-          <a:lstStyle/>
-          <a:p>
-            <a:fld id="{F7021451-1387-4CA6-816F-3879F97B5CBC}" type="slidenum">
-              <a:rPr lang="en-US"/>
-              <a:t>8</a:t>
-            </a:fld>
-            <a:endParaRPr lang="en-US"/>
-          </a:p>
-        </p:txBody>
-      </p:sp>
-    </p:spTree>
-    <p:extLst>
-      <p:ext uri="{BB962C8B-B14F-4D97-AF65-F5344CB8AC3E}">
-        <p14:creationId xmlns:p14="http://schemas.microsoft.com/office/powerpoint/2010/main" val="1024086991"/>
-      </p:ext>
-    </p:extLst>
-  </p:cSld>
-  <p:clrMapOvr>
-    <a:masterClrMapping/>
-  </p:clrMapOvr>
-</p:notes>
-</file>
-
 <file path=ppt/slideLayouts/slideLayout1.xml><?xml version="1.0" encoding="utf-8"?>
 <p:sldLayout xmlns:a="http://schemas.openxmlformats.org/drawingml/2006/main" xmlns:r="http://schemas.openxmlformats.org/officeDocument/2006/relationships" xmlns:p="http://schemas.openxmlformats.org/presentationml/2006/main" preserve="1">
   <p:cSld name="DEFAULT">
@@ -1477,279 +854,6 @@
 <file path=ppt/slides/slide1.xml><?xml version="1.0" encoding="utf-8"?>
 <p:sld xmlns:a="http://schemas.openxmlformats.org/drawingml/2006/main" xmlns:r="http://schemas.openxmlformats.org/officeDocument/2006/relationships" xmlns:p="http://schemas.openxmlformats.org/presentationml/2006/main">
   <p:cSld name="Slide 1">
-    <p:bg>
-      <p:bgPr>
-        <a:blipFill dpi="0" rotWithShape="1">
-          <a:blip r:embed="rId1">
-            <a:lum/>
-          </a:blip>
-          <a:srcRect/>
-          <a:stretch>
-            <a:fillRect/>
-          </a:stretch>
-        </a:blipFill>
-        <a:effectLst/>
-      </p:bgPr>
-    </p:bg>
-    <p:spTree>
-      <p:nvGrpSpPr>
-        <p:cNvPr id="1" name=""/>
-        <p:cNvGrpSpPr/>
-        <p:nvPr/>
-      </p:nvGrpSpPr>
-      <p:grpSpPr>
-        <a:xfrm>
-          <a:off x="0" y="0"/>
-          <a:ext cx="0" cy="0"/>
-          <a:chOff x="0" y="0"/>
-          <a:chExt cx="0" cy="0"/>
-        </a:xfrm>
-      </p:grpSpPr>
-    </p:spTree>
-  </p:cSld>
-  <p:clrMapOvr>
-    <a:masterClrMapping/>
-  </p:clrMapOvr>
-</p:sld>
-</file>
-
-<file path=ppt/slides/slide2.xml><?xml version="1.0" encoding="utf-8"?>
-<p:sld xmlns:a="http://schemas.openxmlformats.org/drawingml/2006/main" xmlns:r="http://schemas.openxmlformats.org/officeDocument/2006/relationships" xmlns:p="http://schemas.openxmlformats.org/presentationml/2006/main">
-  <p:cSld name="Slide 2">
-    <p:bg>
-      <p:bgPr>
-        <a:blipFill dpi="0" rotWithShape="1">
-          <a:blip r:embed="rId1">
-            <a:lum/>
-          </a:blip>
-          <a:srcRect/>
-          <a:stretch>
-            <a:fillRect/>
-          </a:stretch>
-        </a:blipFill>
-        <a:effectLst/>
-      </p:bgPr>
-    </p:bg>
-    <p:spTree>
-      <p:nvGrpSpPr>
-        <p:cNvPr id="1" name=""/>
-        <p:cNvGrpSpPr/>
-        <p:nvPr/>
-      </p:nvGrpSpPr>
-      <p:grpSpPr>
-        <a:xfrm>
-          <a:off x="0" y="0"/>
-          <a:ext cx="0" cy="0"/>
-          <a:chOff x="0" y="0"/>
-          <a:chExt cx="0" cy="0"/>
-        </a:xfrm>
-      </p:grpSpPr>
-    </p:spTree>
-  </p:cSld>
-  <p:clrMapOvr>
-    <a:masterClrMapping/>
-  </p:clrMapOvr>
-</p:sld>
-</file>
-
-<file path=ppt/slides/slide3.xml><?xml version="1.0" encoding="utf-8"?>
-<p:sld xmlns:a="http://schemas.openxmlformats.org/drawingml/2006/main" xmlns:r="http://schemas.openxmlformats.org/officeDocument/2006/relationships" xmlns:p="http://schemas.openxmlformats.org/presentationml/2006/main">
-  <p:cSld name="Slide 3">
-    <p:bg>
-      <p:bgPr>
-        <a:blipFill dpi="0" rotWithShape="1">
-          <a:blip r:embed="rId1">
-            <a:lum/>
-          </a:blip>
-          <a:srcRect/>
-          <a:stretch>
-            <a:fillRect/>
-          </a:stretch>
-        </a:blipFill>
-        <a:effectLst/>
-      </p:bgPr>
-    </p:bg>
-    <p:spTree>
-      <p:nvGrpSpPr>
-        <p:cNvPr id="1" name=""/>
-        <p:cNvGrpSpPr/>
-        <p:nvPr/>
-      </p:nvGrpSpPr>
-      <p:grpSpPr>
-        <a:xfrm>
-          <a:off x="0" y="0"/>
-          <a:ext cx="0" cy="0"/>
-          <a:chOff x="0" y="0"/>
-          <a:chExt cx="0" cy="0"/>
-        </a:xfrm>
-      </p:grpSpPr>
-    </p:spTree>
-  </p:cSld>
-  <p:clrMapOvr>
-    <a:masterClrMapping/>
-  </p:clrMapOvr>
-</p:sld>
-</file>
-
-<file path=ppt/slides/slide4.xml><?xml version="1.0" encoding="utf-8"?>
-<p:sld xmlns:a="http://schemas.openxmlformats.org/drawingml/2006/main" xmlns:r="http://schemas.openxmlformats.org/officeDocument/2006/relationships" xmlns:p="http://schemas.openxmlformats.org/presentationml/2006/main">
-  <p:cSld name="Slide 4">
-    <p:bg>
-      <p:bgPr>
-        <a:blipFill dpi="0" rotWithShape="1">
-          <a:blip r:embed="rId1">
-            <a:lum/>
-          </a:blip>
-          <a:srcRect/>
-          <a:stretch>
-            <a:fillRect/>
-          </a:stretch>
-        </a:blipFill>
-        <a:effectLst/>
-      </p:bgPr>
-    </p:bg>
-    <p:spTree>
-      <p:nvGrpSpPr>
-        <p:cNvPr id="1" name=""/>
-        <p:cNvGrpSpPr/>
-        <p:nvPr/>
-      </p:nvGrpSpPr>
-      <p:grpSpPr>
-        <a:xfrm>
-          <a:off x="0" y="0"/>
-          <a:ext cx="0" cy="0"/>
-          <a:chOff x="0" y="0"/>
-          <a:chExt cx="0" cy="0"/>
-        </a:xfrm>
-      </p:grpSpPr>
-    </p:spTree>
-  </p:cSld>
-  <p:clrMapOvr>
-    <a:masterClrMapping/>
-  </p:clrMapOvr>
-</p:sld>
-</file>
-
-<file path=ppt/slides/slide5.xml><?xml version="1.0" encoding="utf-8"?>
-<p:sld xmlns:a="http://schemas.openxmlformats.org/drawingml/2006/main" xmlns:r="http://schemas.openxmlformats.org/officeDocument/2006/relationships" xmlns:p="http://schemas.openxmlformats.org/presentationml/2006/main">
-  <p:cSld name="Slide 5">
-    <p:bg>
-      <p:bgPr>
-        <a:blipFill dpi="0" rotWithShape="1">
-          <a:blip r:embed="rId1">
-            <a:lum/>
-          </a:blip>
-          <a:srcRect/>
-          <a:stretch>
-            <a:fillRect/>
-          </a:stretch>
-        </a:blipFill>
-        <a:effectLst/>
-      </p:bgPr>
-    </p:bg>
-    <p:spTree>
-      <p:nvGrpSpPr>
-        <p:cNvPr id="1" name=""/>
-        <p:cNvGrpSpPr/>
-        <p:nvPr/>
-      </p:nvGrpSpPr>
-      <p:grpSpPr>
-        <a:xfrm>
-          <a:off x="0" y="0"/>
-          <a:ext cx="0" cy="0"/>
-          <a:chOff x="0" y="0"/>
-          <a:chExt cx="0" cy="0"/>
-        </a:xfrm>
-      </p:grpSpPr>
-    </p:spTree>
-  </p:cSld>
-  <p:clrMapOvr>
-    <a:masterClrMapping/>
-  </p:clrMapOvr>
-</p:sld>
-</file>
-
-<file path=ppt/slides/slide6.xml><?xml version="1.0" encoding="utf-8"?>
-<p:sld xmlns:a="http://schemas.openxmlformats.org/drawingml/2006/main" xmlns:r="http://schemas.openxmlformats.org/officeDocument/2006/relationships" xmlns:p="http://schemas.openxmlformats.org/presentationml/2006/main">
-  <p:cSld name="Slide 6">
-    <p:bg>
-      <p:bgPr>
-        <a:blipFill dpi="0" rotWithShape="1">
-          <a:blip r:embed="rId1">
-            <a:lum/>
-          </a:blip>
-          <a:srcRect/>
-          <a:stretch>
-            <a:fillRect/>
-          </a:stretch>
-        </a:blipFill>
-        <a:effectLst/>
-      </p:bgPr>
-    </p:bg>
-    <p:spTree>
-      <p:nvGrpSpPr>
-        <p:cNvPr id="1" name=""/>
-        <p:cNvGrpSpPr/>
-        <p:nvPr/>
-      </p:nvGrpSpPr>
-      <p:grpSpPr>
-        <a:xfrm>
-          <a:off x="0" y="0"/>
-          <a:ext cx="0" cy="0"/>
-          <a:chOff x="0" y="0"/>
-          <a:chExt cx="0" cy="0"/>
-        </a:xfrm>
-      </p:grpSpPr>
-    </p:spTree>
-  </p:cSld>
-  <p:clrMapOvr>
-    <a:masterClrMapping/>
-  </p:clrMapOvr>
-</p:sld>
-</file>
-
-<file path=ppt/slides/slide7.xml><?xml version="1.0" encoding="utf-8"?>
-<p:sld xmlns:a="http://schemas.openxmlformats.org/drawingml/2006/main" xmlns:r="http://schemas.openxmlformats.org/officeDocument/2006/relationships" xmlns:p="http://schemas.openxmlformats.org/presentationml/2006/main">
-  <p:cSld name="Slide 7">
-    <p:bg>
-      <p:bgPr>
-        <a:blipFill dpi="0" rotWithShape="1">
-          <a:blip r:embed="rId1">
-            <a:lum/>
-          </a:blip>
-          <a:srcRect/>
-          <a:stretch>
-            <a:fillRect/>
-          </a:stretch>
-        </a:blipFill>
-        <a:effectLst/>
-      </p:bgPr>
-    </p:bg>
-    <p:spTree>
-      <p:nvGrpSpPr>
-        <p:cNvPr id="1" name=""/>
-        <p:cNvGrpSpPr/>
-        <p:nvPr/>
-      </p:nvGrpSpPr>
-      <p:grpSpPr>
-        <a:xfrm>
-          <a:off x="0" y="0"/>
-          <a:ext cx="0" cy="0"/>
-          <a:chOff x="0" y="0"/>
-          <a:chExt cx="0" cy="0"/>
-        </a:xfrm>
-      </p:grpSpPr>
-    </p:spTree>
-  </p:cSld>
-  <p:clrMapOvr>
-    <a:masterClrMapping/>
-  </p:clrMapOvr>
-</p:sld>
-</file>
-
-<file path=ppt/slides/slide8.xml><?xml version="1.0" encoding="utf-8"?>
-<p:sld xmlns:a="http://schemas.openxmlformats.org/drawingml/2006/main" xmlns:r="http://schemas.openxmlformats.org/officeDocument/2006/relationships" xmlns:p="http://schemas.openxmlformats.org/presentationml/2006/main">
-  <p:cSld name="Slide 8">
     <p:bg>
       <p:bgPr>
         <a:blipFill dpi="0" rotWithShape="1">

</xml_diff>